<commit_message>
log file and MDC implementation
</commit_message>
<xml_diff>
--- a/training_tasks.pptx
+++ b/training_tasks.pptx
@@ -7,6 +7,8 @@
   <p:sldIdLst>
     <p:sldId id="256" r:id="rId2"/>
     <p:sldId id="257" r:id="rId3"/>
+    <p:sldId id="258" r:id="rId4"/>
+    <p:sldId id="259" r:id="rId5"/>
   </p:sldIdLst>
   <p:sldSz cx="12192000" cy="6858000"/>
   <p:notesSz cx="6858000" cy="9144000"/>
@@ -105,6 +107,11 @@
       </a:defRPr>
     </a:lvl9pPr>
   </p:defaultTextStyle>
+  <p:extLst>
+    <p:ext uri="{EFAFB233-063F-42B5-8137-9DF3F51BA10A}">
+      <p15:sldGuideLst xmlns:p15="http://schemas.microsoft.com/office/powerpoint/2012/main"/>
+    </p:ext>
+  </p:extLst>
 </p:presentation>
 </file>
 
@@ -239,7 +246,7 @@
           <a:p>
             <a:fld id="{F0721855-2BE0-4B70-9F23-625BAAE9C0D7}" type="datetimeFigureOut">
               <a:rPr lang="en-US" smtClean="0"/>
-              <a:t>8/16/2018</a:t>
+              <a:t>8/17/2018</a:t>
             </a:fld>
             <a:endParaRPr lang="en-US"/>
           </a:p>
@@ -409,7 +416,7 @@
           <a:p>
             <a:fld id="{F0721855-2BE0-4B70-9F23-625BAAE9C0D7}" type="datetimeFigureOut">
               <a:rPr lang="en-US" smtClean="0"/>
-              <a:t>8/16/2018</a:t>
+              <a:t>8/17/2018</a:t>
             </a:fld>
             <a:endParaRPr lang="en-US"/>
           </a:p>
@@ -589,7 +596,7 @@
           <a:p>
             <a:fld id="{F0721855-2BE0-4B70-9F23-625BAAE9C0D7}" type="datetimeFigureOut">
               <a:rPr lang="en-US" smtClean="0"/>
-              <a:t>8/16/2018</a:t>
+              <a:t>8/17/2018</a:t>
             </a:fld>
             <a:endParaRPr lang="en-US"/>
           </a:p>
@@ -759,7 +766,7 @@
           <a:p>
             <a:fld id="{F0721855-2BE0-4B70-9F23-625BAAE9C0D7}" type="datetimeFigureOut">
               <a:rPr lang="en-US" smtClean="0"/>
-              <a:t>8/16/2018</a:t>
+              <a:t>8/17/2018</a:t>
             </a:fld>
             <a:endParaRPr lang="en-US"/>
           </a:p>
@@ -1005,7 +1012,7 @@
           <a:p>
             <a:fld id="{F0721855-2BE0-4B70-9F23-625BAAE9C0D7}" type="datetimeFigureOut">
               <a:rPr lang="en-US" smtClean="0"/>
-              <a:t>8/16/2018</a:t>
+              <a:t>8/17/2018</a:t>
             </a:fld>
             <a:endParaRPr lang="en-US"/>
           </a:p>
@@ -1237,7 +1244,7 @@
           <a:p>
             <a:fld id="{F0721855-2BE0-4B70-9F23-625BAAE9C0D7}" type="datetimeFigureOut">
               <a:rPr lang="en-US" smtClean="0"/>
-              <a:t>8/16/2018</a:t>
+              <a:t>8/17/2018</a:t>
             </a:fld>
             <a:endParaRPr lang="en-US"/>
           </a:p>
@@ -1604,7 +1611,7 @@
           <a:p>
             <a:fld id="{F0721855-2BE0-4B70-9F23-625BAAE9C0D7}" type="datetimeFigureOut">
               <a:rPr lang="en-US" smtClean="0"/>
-              <a:t>8/16/2018</a:t>
+              <a:t>8/17/2018</a:t>
             </a:fld>
             <a:endParaRPr lang="en-US"/>
           </a:p>
@@ -1722,7 +1729,7 @@
           <a:p>
             <a:fld id="{F0721855-2BE0-4B70-9F23-625BAAE9C0D7}" type="datetimeFigureOut">
               <a:rPr lang="en-US" smtClean="0"/>
-              <a:t>8/16/2018</a:t>
+              <a:t>8/17/2018</a:t>
             </a:fld>
             <a:endParaRPr lang="en-US"/>
           </a:p>
@@ -1817,7 +1824,7 @@
           <a:p>
             <a:fld id="{F0721855-2BE0-4B70-9F23-625BAAE9C0D7}" type="datetimeFigureOut">
               <a:rPr lang="en-US" smtClean="0"/>
-              <a:t>8/16/2018</a:t>
+              <a:t>8/17/2018</a:t>
             </a:fld>
             <a:endParaRPr lang="en-US"/>
           </a:p>
@@ -2094,7 +2101,7 @@
           <a:p>
             <a:fld id="{F0721855-2BE0-4B70-9F23-625BAAE9C0D7}" type="datetimeFigureOut">
               <a:rPr lang="en-US" smtClean="0"/>
-              <a:t>8/16/2018</a:t>
+              <a:t>8/17/2018</a:t>
             </a:fld>
             <a:endParaRPr lang="en-US"/>
           </a:p>
@@ -2347,7 +2354,7 @@
           <a:p>
             <a:fld id="{F0721855-2BE0-4B70-9F23-625BAAE9C0D7}" type="datetimeFigureOut">
               <a:rPr lang="en-US" smtClean="0"/>
-              <a:t>8/16/2018</a:t>
+              <a:t>8/17/2018</a:t>
             </a:fld>
             <a:endParaRPr lang="en-US"/>
           </a:p>
@@ -2560,7 +2567,7 @@
           <a:p>
             <a:fld id="{F0721855-2BE0-4B70-9F23-625BAAE9C0D7}" type="datetimeFigureOut">
               <a:rPr lang="en-US" smtClean="0"/>
-              <a:t>8/16/2018</a:t>
+              <a:t>8/17/2018</a:t>
             </a:fld>
             <a:endParaRPr lang="en-US"/>
           </a:p>
@@ -3065,7 +3072,7 @@
         <p:spPr/>
         <p:txBody>
           <a:bodyPr>
-            <a:normAutofit fontScale="85000" lnSpcReduction="20000"/>
+            <a:normAutofit fontScale="77500" lnSpcReduction="20000"/>
           </a:bodyPr>
           <a:lstStyle/>
           <a:p>
@@ -3118,13 +3125,8 @@
             </a:r>
             <a:r>
               <a:rPr lang="en-US" dirty="0" smtClean="0"/>
-              <a:t> –Notification(Parallel </a:t>
-            </a:r>
-            <a:r>
-              <a:rPr lang="en-US" smtClean="0"/>
-              <a:t>order processor)</a:t>
-            </a:r>
-            <a:endParaRPr lang="en-US" dirty="0" smtClean="0"/>
+              <a:t> –Notification(Parallel order processor)</a:t>
+            </a:r>
           </a:p>
           <a:p>
             <a:endParaRPr lang="en-US" dirty="0" smtClean="0"/>
@@ -3134,12 +3136,14 @@
               <a:rPr lang="en-US" dirty="0" smtClean="0">
                 <a:hlinkClick r:id="rId6"/>
               </a:rPr>
-              <a:t>http://localhost:8092/service/apigateway?wsdl – soap gateway </a:t>
-            </a:r>
-            <a:r>
-              <a:rPr lang="en-US" dirty="0" err="1" smtClean="0">
-                <a:hlinkClick r:id="rId6"/>
-              </a:rPr>
+              <a:t>http://localhost:8092/service/apigateway?wsdl </a:t>
+            </a:r>
+            <a:r>
+              <a:rPr lang="en-US" dirty="0" smtClean="0"/>
+              <a:t>– soap gateway </a:t>
+            </a:r>
+            <a:r>
+              <a:rPr lang="en-US" dirty="0" err="1" smtClean="0"/>
               <a:t>wsdl</a:t>
             </a:r>
             <a:endParaRPr lang="en-US" dirty="0" smtClean="0">
@@ -3168,15 +3172,17 @@
               <a:rPr lang="en-US" dirty="0" smtClean="0">
                 <a:hlinkClick r:id="rId7"/>
               </a:rPr>
-              <a:t>http://192.168.252.186:8082/login.do</a:t>
+              <a:t>http</a:t>
+            </a:r>
+            <a:r>
+              <a:rPr lang="en-US" dirty="0" smtClean="0">
+                <a:hlinkClick r:id="rId7"/>
+              </a:rPr>
+              <a:t>://192.168.252.186:8082/login.do</a:t>
             </a:r>
             <a:r>
               <a:rPr lang="en-US" dirty="0" smtClean="0"/>
-              <a:t>   - h2 </a:t>
-            </a:r>
-            <a:r>
-              <a:rPr lang="en-US" dirty="0" smtClean="0"/>
-              <a:t>console(</a:t>
+              <a:t>   - h2 console(</a:t>
             </a:r>
             <a:r>
               <a:rPr lang="en-US" u="sng" dirty="0" err="1"/>
@@ -3201,6 +3207,22 @@
             <a:endParaRPr lang="en-US" u="sng" dirty="0" smtClean="0"/>
           </a:p>
           <a:p>
+            <a:r>
+              <a:rPr lang="en-US" u="sng" dirty="0" err="1"/>
+              <a:t>mvn</a:t>
+            </a:r>
+            <a:r>
+              <a:rPr lang="en-US" u="sng" dirty="0"/>
+              <a:t> </a:t>
+            </a:r>
+            <a:r>
+              <a:rPr lang="en-US" u="sng" dirty="0" err="1"/>
+              <a:t>spring-boot:run</a:t>
+            </a:r>
+            <a:r>
+              <a:rPr lang="en-US" u="sng" dirty="0"/>
+              <a:t> -Dlog4j.debug</a:t>
+            </a:r>
             <a:endParaRPr lang="en-US" u="sng" dirty="0" smtClean="0"/>
           </a:p>
           <a:p>
@@ -3221,6 +3243,1403 @@
     <p:extLst>
       <p:ext uri="{BB962C8B-B14F-4D97-AF65-F5344CB8AC3E}">
         <p14:creationId xmlns:p14="http://schemas.microsoft.com/office/powerpoint/2010/main" val="2795562823"/>
+      </p:ext>
+    </p:extLst>
+  </p:cSld>
+  <p:clrMapOvr>
+    <a:masterClrMapping/>
+  </p:clrMapOvr>
+</p:sld>
+</file>
+
+<file path=ppt/slides/slide3.xml><?xml version="1.0" encoding="utf-8"?>
+<p:sld xmlns:a="http://schemas.openxmlformats.org/drawingml/2006/main" xmlns:r="http://schemas.openxmlformats.org/officeDocument/2006/relationships" xmlns:p="http://schemas.openxmlformats.org/presentationml/2006/main">
+  <p:cSld>
+    <p:spTree>
+      <p:nvGrpSpPr>
+        <p:cNvPr id="1" name=""/>
+        <p:cNvGrpSpPr/>
+        <p:nvPr/>
+      </p:nvGrpSpPr>
+      <p:grpSpPr>
+        <a:xfrm>
+          <a:off x="0" y="0"/>
+          <a:ext cx="0" cy="0"/>
+          <a:chOff x="0" y="0"/>
+          <a:chExt cx="0" cy="0"/>
+        </a:xfrm>
+      </p:grpSpPr>
+      <p:sp>
+        <p:nvSpPr>
+          <p:cNvPr id="2" name="Title 1"/>
+          <p:cNvSpPr>
+            <a:spLocks noGrp="1"/>
+          </p:cNvSpPr>
+          <p:nvPr>
+            <p:ph type="title"/>
+          </p:nvPr>
+        </p:nvSpPr>
+        <p:spPr/>
+        <p:txBody>
+          <a:bodyPr/>
+          <a:lstStyle/>
+          <a:p>
+            <a:r>
+              <a:rPr lang="en-US" dirty="0" smtClean="0"/>
+              <a:t>MDC</a:t>
+            </a:r>
+            <a:endParaRPr lang="en-US" dirty="0"/>
+          </a:p>
+        </p:txBody>
+      </p:sp>
+      <p:sp>
+        <p:nvSpPr>
+          <p:cNvPr id="3" name="Content Placeholder 2"/>
+          <p:cNvSpPr>
+            <a:spLocks noGrp="1"/>
+          </p:cNvSpPr>
+          <p:nvPr>
+            <p:ph idx="1"/>
+          </p:nvPr>
+        </p:nvSpPr>
+        <p:spPr/>
+        <p:txBody>
+          <a:bodyPr>
+            <a:normAutofit fontScale="92500"/>
+          </a:bodyPr>
+          <a:lstStyle/>
+          <a:p>
+            <a:r>
+              <a:rPr lang="en-US" dirty="0"/>
+              <a:t>2018-08-17 09:33:51,477 | INFO | OrderServiceProcessor.java 48 | - 257997-0-1 - route1     - 257997-0-1 </a:t>
+            </a:r>
+            <a:r>
+              <a:rPr lang="en-US" dirty="0" err="1"/>
+              <a:t>saveOrderProcessor</a:t>
+            </a:r>
+            <a:r>
+              <a:rPr lang="en-US" dirty="0"/>
+              <a:t> **********************: </a:t>
+            </a:r>
+          </a:p>
+          <a:p>
+            <a:r>
+              <a:rPr lang="en-US" dirty="0"/>
+              <a:t>2018-08-17 09:33:51,477 | INFO | OrderServiceProcessor.java 48 | - 257997-0-1 - route1     - 257997-0-1 </a:t>
+            </a:r>
+            <a:r>
+              <a:rPr lang="en-US" dirty="0" err="1"/>
+              <a:t>saveOrderProcessor</a:t>
+            </a:r>
+            <a:r>
+              <a:rPr lang="en-US" dirty="0"/>
+              <a:t> **********************: </a:t>
+            </a:r>
+          </a:p>
+          <a:p>
+            <a:r>
+              <a:rPr lang="en-US" dirty="0"/>
+              <a:t>2018-08-17 09:33:51,484 | INFO | OrderServiceProcessor.java 56 | - 257997-0-1 - route1     - 257997-0-1 </a:t>
+            </a:r>
+            <a:r>
+              <a:rPr lang="en-US" dirty="0" err="1"/>
+              <a:t>saveOrderProcessor</a:t>
+            </a:r>
+            <a:r>
+              <a:rPr lang="en-US" dirty="0"/>
+              <a:t> called with: 3000</a:t>
+            </a:r>
+          </a:p>
+          <a:p>
+            <a:r>
+              <a:rPr lang="en-US" dirty="0"/>
+              <a:t>2018-08-17 09:33:51,484 | INFO | OrderServiceProcessor.java 56 | - 257997-0-1 - route1     - 257997-0-1 </a:t>
+            </a:r>
+            <a:r>
+              <a:rPr lang="en-US" dirty="0" err="1"/>
+              <a:t>saveOrderProcessor</a:t>
+            </a:r>
+            <a:r>
+              <a:rPr lang="en-US" dirty="0"/>
+              <a:t> called with: 3000</a:t>
+            </a:r>
+          </a:p>
+        </p:txBody>
+      </p:sp>
+    </p:spTree>
+    <p:extLst>
+      <p:ext uri="{BB962C8B-B14F-4D97-AF65-F5344CB8AC3E}">
+        <p14:creationId xmlns:p14="http://schemas.microsoft.com/office/powerpoint/2010/main" val="2625888334"/>
+      </p:ext>
+    </p:extLst>
+  </p:cSld>
+  <p:clrMapOvr>
+    <a:masterClrMapping/>
+  </p:clrMapOvr>
+</p:sld>
+</file>
+
+<file path=ppt/slides/slide4.xml><?xml version="1.0" encoding="utf-8"?>
+<p:sld xmlns:a="http://schemas.openxmlformats.org/drawingml/2006/main" xmlns:r="http://schemas.openxmlformats.org/officeDocument/2006/relationships" xmlns:p="http://schemas.openxmlformats.org/presentationml/2006/main">
+  <p:cSld>
+    <p:spTree>
+      <p:nvGrpSpPr>
+        <p:cNvPr id="1" name=""/>
+        <p:cNvGrpSpPr/>
+        <p:nvPr/>
+      </p:nvGrpSpPr>
+      <p:grpSpPr>
+        <a:xfrm>
+          <a:off x="0" y="0"/>
+          <a:ext cx="0" cy="0"/>
+          <a:chOff x="0" y="0"/>
+          <a:chExt cx="0" cy="0"/>
+        </a:xfrm>
+      </p:grpSpPr>
+      <p:sp>
+        <p:nvSpPr>
+          <p:cNvPr id="2" name="Title 1"/>
+          <p:cNvSpPr>
+            <a:spLocks noGrp="1"/>
+          </p:cNvSpPr>
+          <p:nvPr>
+            <p:ph type="title"/>
+          </p:nvPr>
+        </p:nvSpPr>
+        <p:spPr>
+          <a:xfrm>
+            <a:off x="0" y="-662781"/>
+            <a:ext cx="10515600" cy="472794"/>
+          </a:xfrm>
+        </p:spPr>
+        <p:style>
+          <a:lnRef idx="2">
+            <a:schemeClr val="accent6"/>
+          </a:lnRef>
+          <a:fillRef idx="1">
+            <a:schemeClr val="lt1"/>
+          </a:fillRef>
+          <a:effectRef idx="0">
+            <a:schemeClr val="accent6"/>
+          </a:effectRef>
+          <a:fontRef idx="minor">
+            <a:schemeClr val="dk1"/>
+          </a:fontRef>
+        </p:style>
+        <p:txBody>
+          <a:bodyPr>
+            <a:normAutofit fontScale="90000"/>
+          </a:bodyPr>
+          <a:lstStyle/>
+          <a:p>
+            <a:endParaRPr lang="en-US" dirty="0"/>
+          </a:p>
+        </p:txBody>
+      </p:sp>
+      <p:sp>
+        <p:nvSpPr>
+          <p:cNvPr id="3" name="Content Placeholder 2"/>
+          <p:cNvSpPr>
+            <a:spLocks noGrp="1"/>
+          </p:cNvSpPr>
+          <p:nvPr>
+            <p:ph idx="1"/>
+          </p:nvPr>
+        </p:nvSpPr>
+        <p:spPr>
+          <a:xfrm>
+            <a:off x="130277" y="1031437"/>
+            <a:ext cx="10515600" cy="5032375"/>
+          </a:xfrm>
+        </p:spPr>
+        <p:style>
+          <a:lnRef idx="2">
+            <a:schemeClr val="accent6"/>
+          </a:lnRef>
+          <a:fillRef idx="1">
+            <a:schemeClr val="lt1"/>
+          </a:fillRef>
+          <a:effectRef idx="0">
+            <a:schemeClr val="accent6"/>
+          </a:effectRef>
+          <a:fontRef idx="minor">
+            <a:schemeClr val="dk1"/>
+          </a:fontRef>
+        </p:style>
+        <p:txBody>
+          <a:bodyPr/>
+          <a:lstStyle/>
+          <a:p>
+            <a:pPr marL="914400" lvl="2" indent="0">
+              <a:buNone/>
+            </a:pPr>
+            <a:endParaRPr lang="en-US" dirty="0"/>
+          </a:p>
+        </p:txBody>
+      </p:sp>
+      <p:sp>
+        <p:nvSpPr>
+          <p:cNvPr id="4" name="Rounded Rectangle 3"/>
+          <p:cNvSpPr/>
+          <p:nvPr/>
+        </p:nvSpPr>
+        <p:spPr>
+          <a:xfrm>
+            <a:off x="766915" y="1740310"/>
+            <a:ext cx="2330245" cy="3893574"/>
+          </a:xfrm>
+          <a:prstGeom prst="roundRect">
+            <a:avLst/>
+          </a:prstGeom>
+        </p:spPr>
+        <p:style>
+          <a:lnRef idx="2">
+            <a:schemeClr val="accent6"/>
+          </a:lnRef>
+          <a:fillRef idx="1">
+            <a:schemeClr val="lt1"/>
+          </a:fillRef>
+          <a:effectRef idx="0">
+            <a:schemeClr val="accent6"/>
+          </a:effectRef>
+          <a:fontRef idx="minor">
+            <a:schemeClr val="dk1"/>
+          </a:fontRef>
+        </p:style>
+        <p:txBody>
+          <a:bodyPr rtlCol="0" anchor="ctr"/>
+          <a:lstStyle/>
+          <a:p>
+            <a:pPr algn="ctr"/>
+            <a:endParaRPr lang="en-US" dirty="0" smtClean="0"/>
+          </a:p>
+          <a:p>
+            <a:pPr algn="ctr"/>
+            <a:endParaRPr lang="en-US" dirty="0"/>
+          </a:p>
+          <a:p>
+            <a:pPr algn="ctr"/>
+            <a:r>
+              <a:rPr lang="en-US" dirty="0" smtClean="0"/>
+              <a:t>Soap API Gateway</a:t>
+            </a:r>
+          </a:p>
+          <a:p>
+            <a:pPr algn="ctr"/>
+            <a:r>
+              <a:rPr lang="en-US" dirty="0" smtClean="0"/>
+              <a:t>Port:8092</a:t>
+            </a:r>
+            <a:endParaRPr lang="en-US" dirty="0"/>
+          </a:p>
+          <a:p>
+            <a:pPr algn="ctr"/>
+            <a:endParaRPr lang="en-US" dirty="0"/>
+          </a:p>
+        </p:txBody>
+      </p:sp>
+      <p:sp>
+        <p:nvSpPr>
+          <p:cNvPr id="5" name="Rectangle 4"/>
+          <p:cNvSpPr/>
+          <p:nvPr/>
+        </p:nvSpPr>
+        <p:spPr>
+          <a:xfrm>
+            <a:off x="1356852" y="2927554"/>
+            <a:ext cx="1079093" cy="575187"/>
+          </a:xfrm>
+          <a:prstGeom prst="rect">
+            <a:avLst/>
+          </a:prstGeom>
+        </p:spPr>
+        <p:style>
+          <a:lnRef idx="2">
+            <a:schemeClr val="accent1">
+              <a:shade val="50000"/>
+            </a:schemeClr>
+          </a:lnRef>
+          <a:fillRef idx="1">
+            <a:schemeClr val="accent1"/>
+          </a:fillRef>
+          <a:effectRef idx="0">
+            <a:schemeClr val="accent1"/>
+          </a:effectRef>
+          <a:fontRef idx="minor">
+            <a:schemeClr val="lt1"/>
+          </a:fontRef>
+        </p:style>
+        <p:txBody>
+          <a:bodyPr rtlCol="0" anchor="ctr"/>
+          <a:lstStyle/>
+          <a:p>
+            <a:pPr algn="ctr"/>
+            <a:r>
+              <a:rPr lang="en-US" dirty="0" smtClean="0"/>
+              <a:t>Router</a:t>
+            </a:r>
+            <a:endParaRPr lang="en-US" dirty="0"/>
+          </a:p>
+        </p:txBody>
+      </p:sp>
+      <p:sp>
+        <p:nvSpPr>
+          <p:cNvPr id="6" name="Rounded Rectangle 5"/>
+          <p:cNvSpPr/>
+          <p:nvPr/>
+        </p:nvSpPr>
+        <p:spPr>
+          <a:xfrm>
+            <a:off x="4039827" y="459811"/>
+            <a:ext cx="2197510" cy="1725561"/>
+          </a:xfrm>
+          <a:prstGeom prst="roundRect">
+            <a:avLst/>
+          </a:prstGeom>
+        </p:spPr>
+        <p:style>
+          <a:lnRef idx="2">
+            <a:schemeClr val="accent6"/>
+          </a:lnRef>
+          <a:fillRef idx="1">
+            <a:schemeClr val="lt1"/>
+          </a:fillRef>
+          <a:effectRef idx="0">
+            <a:schemeClr val="accent6"/>
+          </a:effectRef>
+          <a:fontRef idx="minor">
+            <a:schemeClr val="dk1"/>
+          </a:fontRef>
+        </p:style>
+        <p:txBody>
+          <a:bodyPr rtlCol="0" anchor="ctr"/>
+          <a:lstStyle/>
+          <a:p>
+            <a:pPr algn="ctr"/>
+            <a:r>
+              <a:rPr lang="en-US" dirty="0" smtClean="0"/>
+              <a:t>Get Order Rest API</a:t>
+            </a:r>
+          </a:p>
+          <a:p>
+            <a:pPr algn="ctr"/>
+            <a:r>
+              <a:rPr lang="en-US" dirty="0" smtClean="0"/>
+              <a:t>Port:8091</a:t>
+            </a:r>
+            <a:endParaRPr lang="en-US" dirty="0"/>
+          </a:p>
+        </p:txBody>
+      </p:sp>
+      <p:sp>
+        <p:nvSpPr>
+          <p:cNvPr id="8" name="Rounded Rectangle 7"/>
+          <p:cNvSpPr/>
+          <p:nvPr/>
+        </p:nvSpPr>
+        <p:spPr>
+          <a:xfrm>
+            <a:off x="6098454" y="2483514"/>
+            <a:ext cx="2197510" cy="1725561"/>
+          </a:xfrm>
+          <a:prstGeom prst="roundRect">
+            <a:avLst/>
+          </a:prstGeom>
+        </p:spPr>
+        <p:style>
+          <a:lnRef idx="2">
+            <a:schemeClr val="accent6"/>
+          </a:lnRef>
+          <a:fillRef idx="1">
+            <a:schemeClr val="lt1"/>
+          </a:fillRef>
+          <a:effectRef idx="0">
+            <a:schemeClr val="accent6"/>
+          </a:effectRef>
+          <a:fontRef idx="minor">
+            <a:schemeClr val="dk1"/>
+          </a:fontRef>
+        </p:style>
+        <p:txBody>
+          <a:bodyPr rtlCol="0" anchor="ctr"/>
+          <a:lstStyle/>
+          <a:p>
+            <a:pPr algn="ctr"/>
+            <a:r>
+              <a:rPr lang="en-US" dirty="0" smtClean="0"/>
+              <a:t>Post Order Rest API</a:t>
+            </a:r>
+          </a:p>
+          <a:p>
+            <a:pPr algn="ctr"/>
+            <a:r>
+              <a:rPr lang="en-US" dirty="0" smtClean="0"/>
+              <a:t>Port:8095</a:t>
+            </a:r>
+            <a:endParaRPr lang="en-US" dirty="0"/>
+          </a:p>
+          <a:p>
+            <a:pPr algn="ctr"/>
+            <a:endParaRPr lang="en-US" dirty="0"/>
+          </a:p>
+        </p:txBody>
+      </p:sp>
+      <p:sp>
+        <p:nvSpPr>
+          <p:cNvPr id="9" name="Rounded Rectangle 8"/>
+          <p:cNvSpPr/>
+          <p:nvPr/>
+        </p:nvSpPr>
+        <p:spPr>
+          <a:xfrm>
+            <a:off x="3937819" y="4616245"/>
+            <a:ext cx="2197510" cy="1725561"/>
+          </a:xfrm>
+          <a:prstGeom prst="roundRect">
+            <a:avLst/>
+          </a:prstGeom>
+        </p:spPr>
+        <p:style>
+          <a:lnRef idx="2">
+            <a:schemeClr val="accent6"/>
+          </a:lnRef>
+          <a:fillRef idx="1">
+            <a:schemeClr val="lt1"/>
+          </a:fillRef>
+          <a:effectRef idx="0">
+            <a:schemeClr val="accent6"/>
+          </a:effectRef>
+          <a:fontRef idx="minor">
+            <a:schemeClr val="dk1"/>
+          </a:fontRef>
+        </p:style>
+        <p:txBody>
+          <a:bodyPr rtlCol="0" anchor="ctr"/>
+          <a:lstStyle/>
+          <a:p>
+            <a:pPr algn="ctr"/>
+            <a:r>
+              <a:rPr lang="en-US" dirty="0" smtClean="0"/>
+              <a:t>Put Order Rest API</a:t>
+            </a:r>
+          </a:p>
+          <a:p>
+            <a:pPr algn="ctr"/>
+            <a:r>
+              <a:rPr lang="en-US" dirty="0" smtClean="0"/>
+              <a:t>Port:8093</a:t>
+            </a:r>
+            <a:endParaRPr lang="en-US" dirty="0"/>
+          </a:p>
+          <a:p>
+            <a:pPr algn="ctr"/>
+            <a:endParaRPr lang="en-US" dirty="0"/>
+          </a:p>
+        </p:txBody>
+      </p:sp>
+      <p:sp>
+        <p:nvSpPr>
+          <p:cNvPr id="10" name="Rounded Rectangle 9"/>
+          <p:cNvSpPr/>
+          <p:nvPr/>
+        </p:nvSpPr>
+        <p:spPr>
+          <a:xfrm>
+            <a:off x="7800666" y="4254908"/>
+            <a:ext cx="2197510" cy="1990593"/>
+          </a:xfrm>
+          <a:prstGeom prst="roundRect">
+            <a:avLst/>
+          </a:prstGeom>
+        </p:spPr>
+        <p:style>
+          <a:lnRef idx="2">
+            <a:schemeClr val="accent6"/>
+          </a:lnRef>
+          <a:fillRef idx="1">
+            <a:schemeClr val="lt1"/>
+          </a:fillRef>
+          <a:effectRef idx="0">
+            <a:schemeClr val="accent6"/>
+          </a:effectRef>
+          <a:fontRef idx="minor">
+            <a:schemeClr val="dk1"/>
+          </a:fontRef>
+        </p:style>
+        <p:txBody>
+          <a:bodyPr rtlCol="0" anchor="ctr"/>
+          <a:lstStyle/>
+          <a:p>
+            <a:pPr algn="ctr"/>
+            <a:r>
+              <a:rPr lang="en-US" dirty="0" smtClean="0"/>
+              <a:t>Notification Processor</a:t>
+            </a:r>
+          </a:p>
+          <a:p>
+            <a:pPr algn="ctr"/>
+            <a:r>
+              <a:rPr lang="en-US" dirty="0" smtClean="0"/>
+              <a:t>Port:8094</a:t>
+            </a:r>
+            <a:endParaRPr lang="en-US" dirty="0"/>
+          </a:p>
+          <a:p>
+            <a:pPr algn="ctr"/>
+            <a:endParaRPr lang="en-US" dirty="0"/>
+          </a:p>
+        </p:txBody>
+      </p:sp>
+      <p:sp>
+        <p:nvSpPr>
+          <p:cNvPr id="11" name="Flowchart: Predefined Process 10"/>
+          <p:cNvSpPr/>
+          <p:nvPr/>
+        </p:nvSpPr>
+        <p:spPr>
+          <a:xfrm>
+            <a:off x="7028829" y="0"/>
+            <a:ext cx="2231927" cy="1317369"/>
+          </a:xfrm>
+          <a:prstGeom prst="flowChartPredefinedProcess">
+            <a:avLst/>
+          </a:prstGeom>
+        </p:spPr>
+        <p:style>
+          <a:lnRef idx="2">
+            <a:schemeClr val="accent6"/>
+          </a:lnRef>
+          <a:fillRef idx="1">
+            <a:schemeClr val="lt1"/>
+          </a:fillRef>
+          <a:effectRef idx="0">
+            <a:schemeClr val="accent6"/>
+          </a:effectRef>
+          <a:fontRef idx="minor">
+            <a:schemeClr val="dk1"/>
+          </a:fontRef>
+        </p:style>
+        <p:txBody>
+          <a:bodyPr rtlCol="0" anchor="ctr"/>
+          <a:lstStyle/>
+          <a:p>
+            <a:pPr algn="ctr"/>
+            <a:r>
+              <a:rPr lang="en-US" sz="1000" b="1" dirty="0" smtClean="0"/>
+              <a:t>Active MQ</a:t>
+            </a:r>
+          </a:p>
+          <a:p>
+            <a:pPr algn="ctr"/>
+            <a:r>
+              <a:rPr lang="en-US" sz="900" dirty="0" smtClean="0"/>
+              <a:t>Queue://Order</a:t>
+            </a:r>
+          </a:p>
+          <a:p>
+            <a:pPr algn="ctr"/>
+            <a:r>
+              <a:rPr lang="en-US" sz="900" dirty="0" smtClean="0"/>
+              <a:t>Queue://ordernotify</a:t>
+            </a:r>
+            <a:endParaRPr lang="en-US" sz="900" dirty="0"/>
+          </a:p>
+        </p:txBody>
+      </p:sp>
+      <p:sp>
+        <p:nvSpPr>
+          <p:cNvPr id="12" name="Flowchart: Magnetic Disk 11"/>
+          <p:cNvSpPr/>
+          <p:nvPr/>
+        </p:nvSpPr>
+        <p:spPr>
+          <a:xfrm>
+            <a:off x="9099755" y="2035276"/>
+            <a:ext cx="914400" cy="1124977"/>
+          </a:xfrm>
+          <a:prstGeom prst="flowChartMagneticDisk">
+            <a:avLst/>
+          </a:prstGeom>
+        </p:spPr>
+        <p:style>
+          <a:lnRef idx="2">
+            <a:schemeClr val="accent6"/>
+          </a:lnRef>
+          <a:fillRef idx="1">
+            <a:schemeClr val="lt1"/>
+          </a:fillRef>
+          <a:effectRef idx="0">
+            <a:schemeClr val="accent6"/>
+          </a:effectRef>
+          <a:fontRef idx="minor">
+            <a:schemeClr val="dk1"/>
+          </a:fontRef>
+        </p:style>
+        <p:txBody>
+          <a:bodyPr rtlCol="0" anchor="ctr"/>
+          <a:lstStyle/>
+          <a:p>
+            <a:pPr algn="ctr"/>
+            <a:r>
+              <a:rPr lang="en-US" dirty="0" smtClean="0"/>
+              <a:t>Order DB</a:t>
+            </a:r>
+            <a:endParaRPr lang="en-US" dirty="0"/>
+          </a:p>
+        </p:txBody>
+      </p:sp>
+      <p:sp>
+        <p:nvSpPr>
+          <p:cNvPr id="13" name="Flowchart: Connector 12"/>
+          <p:cNvSpPr/>
+          <p:nvPr/>
+        </p:nvSpPr>
+        <p:spPr>
+          <a:xfrm>
+            <a:off x="3554362" y="1093991"/>
+            <a:ext cx="636636" cy="501372"/>
+          </a:xfrm>
+          <a:prstGeom prst="flowChartConnector">
+            <a:avLst/>
+          </a:prstGeom>
+        </p:spPr>
+        <p:style>
+          <a:lnRef idx="2">
+            <a:schemeClr val="accent1">
+              <a:shade val="50000"/>
+            </a:schemeClr>
+          </a:lnRef>
+          <a:fillRef idx="1">
+            <a:schemeClr val="accent1"/>
+          </a:fillRef>
+          <a:effectRef idx="0">
+            <a:schemeClr val="accent1"/>
+          </a:effectRef>
+          <a:fontRef idx="minor">
+            <a:schemeClr val="lt1"/>
+          </a:fontRef>
+        </p:style>
+        <p:txBody>
+          <a:bodyPr rtlCol="0" anchor="ctr"/>
+          <a:lstStyle/>
+          <a:p>
+            <a:pPr algn="ctr"/>
+            <a:r>
+              <a:rPr lang="en-US" sz="800" dirty="0" smtClean="0"/>
+              <a:t>Rest</a:t>
+            </a:r>
+            <a:endParaRPr lang="en-US" sz="800" dirty="0"/>
+          </a:p>
+        </p:txBody>
+      </p:sp>
+      <p:sp>
+        <p:nvSpPr>
+          <p:cNvPr id="16" name="Flowchart: Connector 15"/>
+          <p:cNvSpPr/>
+          <p:nvPr/>
+        </p:nvSpPr>
+        <p:spPr>
+          <a:xfrm>
+            <a:off x="491614" y="3346295"/>
+            <a:ext cx="503901" cy="457200"/>
+          </a:xfrm>
+          <a:prstGeom prst="flowChartConnector">
+            <a:avLst/>
+          </a:prstGeom>
+        </p:spPr>
+        <p:style>
+          <a:lnRef idx="2">
+            <a:schemeClr val="accent1">
+              <a:shade val="50000"/>
+            </a:schemeClr>
+          </a:lnRef>
+          <a:fillRef idx="1">
+            <a:schemeClr val="accent1"/>
+          </a:fillRef>
+          <a:effectRef idx="0">
+            <a:schemeClr val="accent1"/>
+          </a:effectRef>
+          <a:fontRef idx="minor">
+            <a:schemeClr val="lt1"/>
+          </a:fontRef>
+        </p:style>
+        <p:txBody>
+          <a:bodyPr rtlCol="0" anchor="ctr"/>
+          <a:lstStyle/>
+          <a:p>
+            <a:pPr algn="ctr"/>
+            <a:r>
+              <a:rPr lang="en-US" sz="1000" dirty="0" err="1" smtClean="0"/>
+              <a:t>cxf</a:t>
+            </a:r>
+            <a:endParaRPr lang="en-US" sz="1000" dirty="0"/>
+          </a:p>
+        </p:txBody>
+      </p:sp>
+      <p:sp>
+        <p:nvSpPr>
+          <p:cNvPr id="17" name="Flowchart: Connector 16"/>
+          <p:cNvSpPr/>
+          <p:nvPr/>
+        </p:nvSpPr>
+        <p:spPr>
+          <a:xfrm>
+            <a:off x="2657166" y="2380276"/>
+            <a:ext cx="715295" cy="457200"/>
+          </a:xfrm>
+          <a:prstGeom prst="flowChartConnector">
+            <a:avLst/>
+          </a:prstGeom>
+        </p:spPr>
+        <p:style>
+          <a:lnRef idx="2">
+            <a:schemeClr val="accent1">
+              <a:shade val="50000"/>
+            </a:schemeClr>
+          </a:lnRef>
+          <a:fillRef idx="1">
+            <a:schemeClr val="accent1"/>
+          </a:fillRef>
+          <a:effectRef idx="0">
+            <a:schemeClr val="accent1"/>
+          </a:effectRef>
+          <a:fontRef idx="minor">
+            <a:schemeClr val="lt1"/>
+          </a:fontRef>
+        </p:style>
+        <p:txBody>
+          <a:bodyPr rtlCol="0" anchor="ctr"/>
+          <a:lstStyle/>
+          <a:p>
+            <a:pPr algn="ctr"/>
+            <a:r>
+              <a:rPr lang="en-US" sz="900" dirty="0" smtClean="0"/>
+              <a:t>http4</a:t>
+            </a:r>
+            <a:endParaRPr lang="en-US" sz="900" dirty="0"/>
+          </a:p>
+        </p:txBody>
+      </p:sp>
+      <p:sp>
+        <p:nvSpPr>
+          <p:cNvPr id="21" name="Flowchart: Connector 20"/>
+          <p:cNvSpPr/>
+          <p:nvPr/>
+        </p:nvSpPr>
+        <p:spPr>
+          <a:xfrm>
+            <a:off x="6098454" y="1093991"/>
+            <a:ext cx="624347" cy="457200"/>
+          </a:xfrm>
+          <a:prstGeom prst="flowChartConnector">
+            <a:avLst/>
+          </a:prstGeom>
+        </p:spPr>
+        <p:style>
+          <a:lnRef idx="2">
+            <a:schemeClr val="accent1">
+              <a:shade val="50000"/>
+            </a:schemeClr>
+          </a:lnRef>
+          <a:fillRef idx="1">
+            <a:schemeClr val="accent1"/>
+          </a:fillRef>
+          <a:effectRef idx="0">
+            <a:schemeClr val="accent1"/>
+          </a:effectRef>
+          <a:fontRef idx="minor">
+            <a:schemeClr val="lt1"/>
+          </a:fontRef>
+        </p:style>
+        <p:txBody>
+          <a:bodyPr rtlCol="0" anchor="ctr"/>
+          <a:lstStyle/>
+          <a:p>
+            <a:pPr algn="ctr"/>
+            <a:r>
+              <a:rPr lang="en-US" sz="900" dirty="0" smtClean="0"/>
+              <a:t>SQL</a:t>
+            </a:r>
+            <a:endParaRPr lang="en-US" sz="900" dirty="0"/>
+          </a:p>
+        </p:txBody>
+      </p:sp>
+      <p:sp>
+        <p:nvSpPr>
+          <p:cNvPr id="22" name="Flowchart: Connector 21"/>
+          <p:cNvSpPr/>
+          <p:nvPr/>
+        </p:nvSpPr>
+        <p:spPr>
+          <a:xfrm>
+            <a:off x="8030489" y="2665203"/>
+            <a:ext cx="512510" cy="457200"/>
+          </a:xfrm>
+          <a:prstGeom prst="flowChartConnector">
+            <a:avLst/>
+          </a:prstGeom>
+        </p:spPr>
+        <p:style>
+          <a:lnRef idx="2">
+            <a:schemeClr val="accent1">
+              <a:shade val="50000"/>
+            </a:schemeClr>
+          </a:lnRef>
+          <a:fillRef idx="1">
+            <a:schemeClr val="accent1"/>
+          </a:fillRef>
+          <a:effectRef idx="0">
+            <a:schemeClr val="accent1"/>
+          </a:effectRef>
+          <a:fontRef idx="minor">
+            <a:schemeClr val="lt1"/>
+          </a:fontRef>
+        </p:style>
+        <p:txBody>
+          <a:bodyPr rtlCol="0" anchor="ctr"/>
+          <a:lstStyle/>
+          <a:p>
+            <a:pPr algn="ctr"/>
+            <a:r>
+              <a:rPr lang="en-US" sz="900" dirty="0" smtClean="0"/>
+              <a:t>JPA</a:t>
+            </a:r>
+            <a:endParaRPr lang="en-US" sz="900" dirty="0"/>
+          </a:p>
+        </p:txBody>
+      </p:sp>
+      <p:sp>
+        <p:nvSpPr>
+          <p:cNvPr id="23" name="Flowchart: Connector 22"/>
+          <p:cNvSpPr/>
+          <p:nvPr/>
+        </p:nvSpPr>
+        <p:spPr>
+          <a:xfrm>
+            <a:off x="5882149" y="5117689"/>
+            <a:ext cx="651385" cy="457200"/>
+          </a:xfrm>
+          <a:prstGeom prst="flowChartConnector">
+            <a:avLst/>
+          </a:prstGeom>
+        </p:spPr>
+        <p:style>
+          <a:lnRef idx="2">
+            <a:schemeClr val="accent1">
+              <a:shade val="50000"/>
+            </a:schemeClr>
+          </a:lnRef>
+          <a:fillRef idx="1">
+            <a:schemeClr val="accent1"/>
+          </a:fillRef>
+          <a:effectRef idx="0">
+            <a:schemeClr val="accent1"/>
+          </a:effectRef>
+          <a:fontRef idx="minor">
+            <a:schemeClr val="lt1"/>
+          </a:fontRef>
+        </p:style>
+        <p:txBody>
+          <a:bodyPr rtlCol="0" anchor="ctr"/>
+          <a:lstStyle/>
+          <a:p>
+            <a:pPr algn="ctr"/>
+            <a:r>
+              <a:rPr lang="en-US" sz="900" dirty="0" smtClean="0"/>
+              <a:t>AMQ</a:t>
+            </a:r>
+            <a:endParaRPr lang="en-US" sz="900" dirty="0"/>
+          </a:p>
+        </p:txBody>
+      </p:sp>
+      <p:sp>
+        <p:nvSpPr>
+          <p:cNvPr id="32" name="Flowchart: Connector 31"/>
+          <p:cNvSpPr/>
+          <p:nvPr/>
+        </p:nvSpPr>
+        <p:spPr>
+          <a:xfrm>
+            <a:off x="2722304" y="3408542"/>
+            <a:ext cx="715295" cy="457200"/>
+          </a:xfrm>
+          <a:prstGeom prst="flowChartConnector">
+            <a:avLst/>
+          </a:prstGeom>
+        </p:spPr>
+        <p:style>
+          <a:lnRef idx="2">
+            <a:schemeClr val="accent1">
+              <a:shade val="50000"/>
+            </a:schemeClr>
+          </a:lnRef>
+          <a:fillRef idx="1">
+            <a:schemeClr val="accent1"/>
+          </a:fillRef>
+          <a:effectRef idx="0">
+            <a:schemeClr val="accent1"/>
+          </a:effectRef>
+          <a:fontRef idx="minor">
+            <a:schemeClr val="lt1"/>
+          </a:fontRef>
+        </p:style>
+        <p:txBody>
+          <a:bodyPr rtlCol="0" anchor="ctr"/>
+          <a:lstStyle/>
+          <a:p>
+            <a:pPr algn="ctr"/>
+            <a:r>
+              <a:rPr lang="en-US" sz="900" dirty="0" smtClean="0"/>
+              <a:t>http4</a:t>
+            </a:r>
+            <a:endParaRPr lang="en-US" sz="900" dirty="0"/>
+          </a:p>
+        </p:txBody>
+      </p:sp>
+      <p:sp>
+        <p:nvSpPr>
+          <p:cNvPr id="33" name="Flowchart: Connector 32"/>
+          <p:cNvSpPr/>
+          <p:nvPr/>
+        </p:nvSpPr>
+        <p:spPr>
+          <a:xfrm>
+            <a:off x="2700184" y="4599115"/>
+            <a:ext cx="715295" cy="457200"/>
+          </a:xfrm>
+          <a:prstGeom prst="flowChartConnector">
+            <a:avLst/>
+          </a:prstGeom>
+        </p:spPr>
+        <p:style>
+          <a:lnRef idx="2">
+            <a:schemeClr val="accent1">
+              <a:shade val="50000"/>
+            </a:schemeClr>
+          </a:lnRef>
+          <a:fillRef idx="1">
+            <a:schemeClr val="accent1"/>
+          </a:fillRef>
+          <a:effectRef idx="0">
+            <a:schemeClr val="accent1"/>
+          </a:effectRef>
+          <a:fontRef idx="minor">
+            <a:schemeClr val="lt1"/>
+          </a:fontRef>
+        </p:style>
+        <p:txBody>
+          <a:bodyPr rtlCol="0" anchor="ctr"/>
+          <a:lstStyle/>
+          <a:p>
+            <a:pPr algn="ctr"/>
+            <a:r>
+              <a:rPr lang="en-US" sz="900" dirty="0" smtClean="0"/>
+              <a:t>http4</a:t>
+            </a:r>
+            <a:endParaRPr lang="en-US" sz="900" dirty="0"/>
+          </a:p>
+        </p:txBody>
+      </p:sp>
+      <p:sp>
+        <p:nvSpPr>
+          <p:cNvPr id="35" name="Flowchart: Connector 34"/>
+          <p:cNvSpPr/>
+          <p:nvPr/>
+        </p:nvSpPr>
+        <p:spPr>
+          <a:xfrm>
+            <a:off x="8056302" y="3648637"/>
+            <a:ext cx="624347" cy="457200"/>
+          </a:xfrm>
+          <a:prstGeom prst="flowChartConnector">
+            <a:avLst/>
+          </a:prstGeom>
+        </p:spPr>
+        <p:style>
+          <a:lnRef idx="2">
+            <a:schemeClr val="accent1">
+              <a:shade val="50000"/>
+            </a:schemeClr>
+          </a:lnRef>
+          <a:fillRef idx="1">
+            <a:schemeClr val="accent1"/>
+          </a:fillRef>
+          <a:effectRef idx="0">
+            <a:schemeClr val="accent1"/>
+          </a:effectRef>
+          <a:fontRef idx="minor">
+            <a:schemeClr val="lt1"/>
+          </a:fontRef>
+        </p:style>
+        <p:txBody>
+          <a:bodyPr rtlCol="0" anchor="ctr"/>
+          <a:lstStyle/>
+          <a:p>
+            <a:pPr algn="ctr"/>
+            <a:r>
+              <a:rPr lang="en-US" sz="900" dirty="0" smtClean="0"/>
+              <a:t>SQL</a:t>
+            </a:r>
+            <a:endParaRPr lang="en-US" sz="900" dirty="0"/>
+          </a:p>
+        </p:txBody>
+      </p:sp>
+      <p:sp>
+        <p:nvSpPr>
+          <p:cNvPr id="36" name="Flowchart: Connector 35"/>
+          <p:cNvSpPr/>
+          <p:nvPr/>
+        </p:nvSpPr>
+        <p:spPr>
+          <a:xfrm>
+            <a:off x="7397544" y="4358146"/>
+            <a:ext cx="624347" cy="457200"/>
+          </a:xfrm>
+          <a:prstGeom prst="flowChartConnector">
+            <a:avLst/>
+          </a:prstGeom>
+        </p:spPr>
+        <p:style>
+          <a:lnRef idx="2">
+            <a:schemeClr val="accent1">
+              <a:shade val="50000"/>
+            </a:schemeClr>
+          </a:lnRef>
+          <a:fillRef idx="1">
+            <a:schemeClr val="accent1"/>
+          </a:fillRef>
+          <a:effectRef idx="0">
+            <a:schemeClr val="accent1"/>
+          </a:effectRef>
+          <a:fontRef idx="minor">
+            <a:schemeClr val="lt1"/>
+          </a:fontRef>
+        </p:style>
+        <p:txBody>
+          <a:bodyPr rtlCol="0" anchor="ctr"/>
+          <a:lstStyle/>
+          <a:p>
+            <a:pPr algn="ctr"/>
+            <a:r>
+              <a:rPr lang="en-US" sz="900" dirty="0" smtClean="0"/>
+              <a:t>SQL</a:t>
+            </a:r>
+            <a:endParaRPr lang="en-US" sz="900" dirty="0"/>
+          </a:p>
+        </p:txBody>
+      </p:sp>
+      <p:sp>
+        <p:nvSpPr>
+          <p:cNvPr id="37" name="Flowchart: Connector 36"/>
+          <p:cNvSpPr/>
+          <p:nvPr/>
+        </p:nvSpPr>
+        <p:spPr>
+          <a:xfrm>
+            <a:off x="9630697" y="5336341"/>
+            <a:ext cx="624347" cy="457200"/>
+          </a:xfrm>
+          <a:prstGeom prst="flowChartConnector">
+            <a:avLst/>
+          </a:prstGeom>
+        </p:spPr>
+        <p:style>
+          <a:lnRef idx="2">
+            <a:schemeClr val="accent1">
+              <a:shade val="50000"/>
+            </a:schemeClr>
+          </a:lnRef>
+          <a:fillRef idx="1">
+            <a:schemeClr val="accent1"/>
+          </a:fillRef>
+          <a:effectRef idx="0">
+            <a:schemeClr val="accent1"/>
+          </a:effectRef>
+          <a:fontRef idx="minor">
+            <a:schemeClr val="lt1"/>
+          </a:fontRef>
+        </p:style>
+        <p:txBody>
+          <a:bodyPr rtlCol="0" anchor="ctr"/>
+          <a:lstStyle/>
+          <a:p>
+            <a:pPr algn="ctr"/>
+            <a:r>
+              <a:rPr lang="en-US" sz="900" dirty="0" smtClean="0"/>
+              <a:t>SQL</a:t>
+            </a:r>
+            <a:endParaRPr lang="en-US" sz="900" dirty="0"/>
+          </a:p>
+        </p:txBody>
+      </p:sp>
+      <p:sp>
+        <p:nvSpPr>
+          <p:cNvPr id="38" name="Flowchart: Connector 37"/>
+          <p:cNvSpPr/>
+          <p:nvPr/>
+        </p:nvSpPr>
+        <p:spPr>
+          <a:xfrm>
+            <a:off x="9630697" y="4497029"/>
+            <a:ext cx="651385" cy="457200"/>
+          </a:xfrm>
+          <a:prstGeom prst="flowChartConnector">
+            <a:avLst/>
+          </a:prstGeom>
+        </p:spPr>
+        <p:style>
+          <a:lnRef idx="2">
+            <a:schemeClr val="accent1">
+              <a:shade val="50000"/>
+            </a:schemeClr>
+          </a:lnRef>
+          <a:fillRef idx="1">
+            <a:schemeClr val="accent1"/>
+          </a:fillRef>
+          <a:effectRef idx="0">
+            <a:schemeClr val="accent1"/>
+          </a:effectRef>
+          <a:fontRef idx="minor">
+            <a:schemeClr val="lt1"/>
+          </a:fontRef>
+        </p:style>
+        <p:txBody>
+          <a:bodyPr rtlCol="0" anchor="ctr"/>
+          <a:lstStyle/>
+          <a:p>
+            <a:pPr algn="ctr"/>
+            <a:r>
+              <a:rPr lang="en-US" sz="900" dirty="0" smtClean="0"/>
+              <a:t>AMQ</a:t>
+            </a:r>
+            <a:endParaRPr lang="en-US" sz="900" dirty="0"/>
+          </a:p>
+        </p:txBody>
+      </p:sp>
+      <p:sp>
+        <p:nvSpPr>
+          <p:cNvPr id="39" name="Flowchart: Connector 38"/>
+          <p:cNvSpPr/>
+          <p:nvPr/>
+        </p:nvSpPr>
+        <p:spPr>
+          <a:xfrm>
+            <a:off x="5780139" y="2588644"/>
+            <a:ext cx="636636" cy="501372"/>
+          </a:xfrm>
+          <a:prstGeom prst="flowChartConnector">
+            <a:avLst/>
+          </a:prstGeom>
+        </p:spPr>
+        <p:style>
+          <a:lnRef idx="2">
+            <a:schemeClr val="accent1">
+              <a:shade val="50000"/>
+            </a:schemeClr>
+          </a:lnRef>
+          <a:fillRef idx="1">
+            <a:schemeClr val="accent1"/>
+          </a:fillRef>
+          <a:effectRef idx="0">
+            <a:schemeClr val="accent1"/>
+          </a:effectRef>
+          <a:fontRef idx="minor">
+            <a:schemeClr val="lt1"/>
+          </a:fontRef>
+        </p:style>
+        <p:txBody>
+          <a:bodyPr rtlCol="0" anchor="ctr"/>
+          <a:lstStyle/>
+          <a:p>
+            <a:pPr algn="ctr"/>
+            <a:r>
+              <a:rPr lang="en-US" sz="800" dirty="0" smtClean="0"/>
+              <a:t>Rest</a:t>
+            </a:r>
+            <a:endParaRPr lang="en-US" sz="800" dirty="0"/>
+          </a:p>
+        </p:txBody>
+      </p:sp>
+      <p:sp>
+        <p:nvSpPr>
+          <p:cNvPr id="40" name="Flowchart: Connector 39"/>
+          <p:cNvSpPr/>
+          <p:nvPr/>
+        </p:nvSpPr>
+        <p:spPr>
+          <a:xfrm>
+            <a:off x="3554362" y="5117688"/>
+            <a:ext cx="636636" cy="501372"/>
+          </a:xfrm>
+          <a:prstGeom prst="flowChartConnector">
+            <a:avLst/>
+          </a:prstGeom>
+        </p:spPr>
+        <p:style>
+          <a:lnRef idx="2">
+            <a:schemeClr val="accent1">
+              <a:shade val="50000"/>
+            </a:schemeClr>
+          </a:lnRef>
+          <a:fillRef idx="1">
+            <a:schemeClr val="accent1"/>
+          </a:fillRef>
+          <a:effectRef idx="0">
+            <a:schemeClr val="accent1"/>
+          </a:effectRef>
+          <a:fontRef idx="minor">
+            <a:schemeClr val="lt1"/>
+          </a:fontRef>
+        </p:style>
+        <p:txBody>
+          <a:bodyPr rtlCol="0" anchor="ctr"/>
+          <a:lstStyle/>
+          <a:p>
+            <a:pPr algn="ctr"/>
+            <a:r>
+              <a:rPr lang="en-US" sz="800" dirty="0" smtClean="0"/>
+              <a:t>Rest</a:t>
+            </a:r>
+            <a:endParaRPr lang="en-US" sz="800" dirty="0"/>
+          </a:p>
+        </p:txBody>
+      </p:sp>
+      <p:sp>
+        <p:nvSpPr>
+          <p:cNvPr id="42" name="Flowchart: Connector 41"/>
+          <p:cNvSpPr/>
+          <p:nvPr/>
+        </p:nvSpPr>
+        <p:spPr>
+          <a:xfrm>
+            <a:off x="5724832" y="3662473"/>
+            <a:ext cx="651385" cy="457200"/>
+          </a:xfrm>
+          <a:prstGeom prst="flowChartConnector">
+            <a:avLst/>
+          </a:prstGeom>
+        </p:spPr>
+        <p:style>
+          <a:lnRef idx="2">
+            <a:schemeClr val="accent1">
+              <a:shade val="50000"/>
+            </a:schemeClr>
+          </a:lnRef>
+          <a:fillRef idx="1">
+            <a:schemeClr val="accent1"/>
+          </a:fillRef>
+          <a:effectRef idx="0">
+            <a:schemeClr val="accent1"/>
+          </a:effectRef>
+          <a:fontRef idx="minor">
+            <a:schemeClr val="lt1"/>
+          </a:fontRef>
+        </p:style>
+        <p:txBody>
+          <a:bodyPr rtlCol="0" anchor="ctr"/>
+          <a:lstStyle/>
+          <a:p>
+            <a:pPr algn="ctr"/>
+            <a:r>
+              <a:rPr lang="en-US" sz="900" dirty="0" smtClean="0"/>
+              <a:t>AMQ</a:t>
+            </a:r>
+            <a:endParaRPr lang="en-US" sz="900" dirty="0"/>
+          </a:p>
+        </p:txBody>
+      </p:sp>
+      <p:sp>
+        <p:nvSpPr>
+          <p:cNvPr id="44" name="Flowchart: Connector 43"/>
+          <p:cNvSpPr/>
+          <p:nvPr/>
+        </p:nvSpPr>
+        <p:spPr>
+          <a:xfrm>
+            <a:off x="6904702" y="4954229"/>
+            <a:ext cx="1319982" cy="457200"/>
+          </a:xfrm>
+          <a:prstGeom prst="flowChartConnector">
+            <a:avLst/>
+          </a:prstGeom>
+        </p:spPr>
+        <p:style>
+          <a:lnRef idx="2">
+            <a:schemeClr val="accent1">
+              <a:shade val="50000"/>
+            </a:schemeClr>
+          </a:lnRef>
+          <a:fillRef idx="1">
+            <a:schemeClr val="accent1"/>
+          </a:fillRef>
+          <a:effectRef idx="0">
+            <a:schemeClr val="accent1"/>
+          </a:effectRef>
+          <a:fontRef idx="minor">
+            <a:schemeClr val="lt1"/>
+          </a:fontRef>
+        </p:style>
+        <p:txBody>
+          <a:bodyPr rtlCol="0" anchor="ctr"/>
+          <a:lstStyle/>
+          <a:p>
+            <a:pPr algn="ctr"/>
+            <a:r>
+              <a:rPr lang="en-US" sz="900" dirty="0" smtClean="0"/>
+              <a:t>File://ordersimulator</a:t>
+            </a:r>
+            <a:endParaRPr lang="en-US" sz="900" dirty="0"/>
+          </a:p>
+        </p:txBody>
+      </p:sp>
+      <p:sp>
+        <p:nvSpPr>
+          <p:cNvPr id="45" name="Flowchart: Connector 44"/>
+          <p:cNvSpPr/>
+          <p:nvPr/>
+        </p:nvSpPr>
+        <p:spPr>
+          <a:xfrm>
+            <a:off x="6835881" y="5509020"/>
+            <a:ext cx="1527684" cy="457200"/>
+          </a:xfrm>
+          <a:prstGeom prst="flowChartConnector">
+            <a:avLst/>
+          </a:prstGeom>
+        </p:spPr>
+        <p:style>
+          <a:lnRef idx="2">
+            <a:schemeClr val="accent1">
+              <a:shade val="50000"/>
+            </a:schemeClr>
+          </a:lnRef>
+          <a:fillRef idx="1">
+            <a:schemeClr val="accent1"/>
+          </a:fillRef>
+          <a:effectRef idx="0">
+            <a:schemeClr val="accent1"/>
+          </a:effectRef>
+          <a:fontRef idx="minor">
+            <a:schemeClr val="lt1"/>
+          </a:fontRef>
+        </p:style>
+        <p:txBody>
+          <a:bodyPr rtlCol="0" anchor="ctr"/>
+          <a:lstStyle/>
+          <a:p>
+            <a:pPr algn="ctr"/>
+            <a:r>
+              <a:rPr lang="en-US" sz="900" dirty="0" smtClean="0"/>
+              <a:t>File://orderproces</a:t>
+            </a:r>
+            <a:endParaRPr lang="en-US" sz="900" dirty="0"/>
+          </a:p>
+        </p:txBody>
+      </p:sp>
+    </p:spTree>
+    <p:extLst>
+      <p:ext uri="{BB962C8B-B14F-4D97-AF65-F5344CB8AC3E}">
+        <p14:creationId xmlns:p14="http://schemas.microsoft.com/office/powerpoint/2010/main" val="3959881480"/>
       </p:ext>
     </p:extLst>
   </p:cSld>

</xml_diff>

<commit_message>
camel jdbc transaction added and presentation completed
</commit_message>
<xml_diff>
--- a/training_tasks.pptx
+++ b/training_tasks.pptx
@@ -246,7 +246,7 @@
           <a:p>
             <a:fld id="{F0721855-2BE0-4B70-9F23-625BAAE9C0D7}" type="datetimeFigureOut">
               <a:rPr lang="en-US" smtClean="0"/>
-              <a:t>8/17/2018</a:t>
+              <a:t>8/20/2018</a:t>
             </a:fld>
             <a:endParaRPr lang="en-US"/>
           </a:p>
@@ -416,7 +416,7 @@
           <a:p>
             <a:fld id="{F0721855-2BE0-4B70-9F23-625BAAE9C0D7}" type="datetimeFigureOut">
               <a:rPr lang="en-US" smtClean="0"/>
-              <a:t>8/17/2018</a:t>
+              <a:t>8/20/2018</a:t>
             </a:fld>
             <a:endParaRPr lang="en-US"/>
           </a:p>
@@ -596,7 +596,7 @@
           <a:p>
             <a:fld id="{F0721855-2BE0-4B70-9F23-625BAAE9C0D7}" type="datetimeFigureOut">
               <a:rPr lang="en-US" smtClean="0"/>
-              <a:t>8/17/2018</a:t>
+              <a:t>8/20/2018</a:t>
             </a:fld>
             <a:endParaRPr lang="en-US"/>
           </a:p>
@@ -766,7 +766,7 @@
           <a:p>
             <a:fld id="{F0721855-2BE0-4B70-9F23-625BAAE9C0D7}" type="datetimeFigureOut">
               <a:rPr lang="en-US" smtClean="0"/>
-              <a:t>8/17/2018</a:t>
+              <a:t>8/20/2018</a:t>
             </a:fld>
             <a:endParaRPr lang="en-US"/>
           </a:p>
@@ -1012,7 +1012,7 @@
           <a:p>
             <a:fld id="{F0721855-2BE0-4B70-9F23-625BAAE9C0D7}" type="datetimeFigureOut">
               <a:rPr lang="en-US" smtClean="0"/>
-              <a:t>8/17/2018</a:t>
+              <a:t>8/20/2018</a:t>
             </a:fld>
             <a:endParaRPr lang="en-US"/>
           </a:p>
@@ -1244,7 +1244,7 @@
           <a:p>
             <a:fld id="{F0721855-2BE0-4B70-9F23-625BAAE9C0D7}" type="datetimeFigureOut">
               <a:rPr lang="en-US" smtClean="0"/>
-              <a:t>8/17/2018</a:t>
+              <a:t>8/20/2018</a:t>
             </a:fld>
             <a:endParaRPr lang="en-US"/>
           </a:p>
@@ -1611,7 +1611,7 @@
           <a:p>
             <a:fld id="{F0721855-2BE0-4B70-9F23-625BAAE9C0D7}" type="datetimeFigureOut">
               <a:rPr lang="en-US" smtClean="0"/>
-              <a:t>8/17/2018</a:t>
+              <a:t>8/20/2018</a:t>
             </a:fld>
             <a:endParaRPr lang="en-US"/>
           </a:p>
@@ -1729,7 +1729,7 @@
           <a:p>
             <a:fld id="{F0721855-2BE0-4B70-9F23-625BAAE9C0D7}" type="datetimeFigureOut">
               <a:rPr lang="en-US" smtClean="0"/>
-              <a:t>8/17/2018</a:t>
+              <a:t>8/20/2018</a:t>
             </a:fld>
             <a:endParaRPr lang="en-US"/>
           </a:p>
@@ -1824,7 +1824,7 @@
           <a:p>
             <a:fld id="{F0721855-2BE0-4B70-9F23-625BAAE9C0D7}" type="datetimeFigureOut">
               <a:rPr lang="en-US" smtClean="0"/>
-              <a:t>8/17/2018</a:t>
+              <a:t>8/20/2018</a:t>
             </a:fld>
             <a:endParaRPr lang="en-US"/>
           </a:p>
@@ -2101,7 +2101,7 @@
           <a:p>
             <a:fld id="{F0721855-2BE0-4B70-9F23-625BAAE9C0D7}" type="datetimeFigureOut">
               <a:rPr lang="en-US" smtClean="0"/>
-              <a:t>8/17/2018</a:t>
+              <a:t>8/20/2018</a:t>
             </a:fld>
             <a:endParaRPr lang="en-US"/>
           </a:p>
@@ -2354,7 +2354,7 @@
           <a:p>
             <a:fld id="{F0721855-2BE0-4B70-9F23-625BAAE9C0D7}" type="datetimeFigureOut">
               <a:rPr lang="en-US" smtClean="0"/>
-              <a:t>8/17/2018</a:t>
+              <a:t>8/20/2018</a:t>
             </a:fld>
             <a:endParaRPr lang="en-US"/>
           </a:p>
@@ -2567,7 +2567,7 @@
           <a:p>
             <a:fld id="{F0721855-2BE0-4B70-9F23-625BAAE9C0D7}" type="datetimeFigureOut">
               <a:rPr lang="en-US" smtClean="0"/>
-              <a:t>8/17/2018</a:t>
+              <a:t>8/20/2018</a:t>
             </a:fld>
             <a:endParaRPr lang="en-US"/>
           </a:p>
@@ -3020,6 +3020,13 @@
   <p:clrMapOvr>
     <a:masterClrMapping/>
   </p:clrMapOvr>
+  <p:timing>
+    <p:tnLst>
+      <p:par>
+        <p:cTn id="1" dur="indefinite" restart="never" nodeType="tmRoot"/>
+      </p:par>
+    </p:tnLst>
+  </p:timing>
 </p:sld>
 </file>
 
@@ -3172,13 +3179,7 @@
               <a:rPr lang="en-US" dirty="0" smtClean="0">
                 <a:hlinkClick r:id="rId7"/>
               </a:rPr>
-              <a:t>http</a:t>
-            </a:r>
-            <a:r>
-              <a:rPr lang="en-US" dirty="0" smtClean="0">
-                <a:hlinkClick r:id="rId7"/>
-              </a:rPr>
-              <a:t>://192.168.252.186:8082/login.do</a:t>
+              <a:t>http://192.168.252.186:8082/login.do</a:t>
             </a:r>
             <a:r>
               <a:rPr lang="en-US" dirty="0" smtClean="0"/>
@@ -3249,6 +3250,13 @@
   <p:clrMapOvr>
     <a:masterClrMapping/>
   </p:clrMapOvr>
+  <p:timing>
+    <p:tnLst>
+      <p:par>
+        <p:cTn id="1" dur="indefinite" restart="never" nodeType="tmRoot"/>
+      </p:par>
+    </p:tnLst>
+  </p:timing>
 </p:sld>
 </file>
 
@@ -3376,6 +3384,13 @@
   <p:clrMapOvr>
     <a:masterClrMapping/>
   </p:clrMapOvr>
+  <p:timing>
+    <p:tnLst>
+      <p:par>
+        <p:cTn id="1" dur="indefinite" restart="never" nodeType="tmRoot"/>
+      </p:par>
+    </p:tnLst>
+  </p:timing>
 </p:sld>
 </file>
 
@@ -3398,19 +3413,377 @@
       </p:grpSpPr>
       <p:sp>
         <p:nvSpPr>
-          <p:cNvPr id="2" name="Title 1"/>
-          <p:cNvSpPr>
-            <a:spLocks noGrp="1"/>
-          </p:cNvSpPr>
-          <p:nvPr>
-            <p:ph type="title"/>
-          </p:nvPr>
-        </p:nvSpPr>
-        <p:spPr>
-          <a:xfrm>
-            <a:off x="0" y="-662781"/>
-            <a:ext cx="10515600" cy="472794"/>
-          </a:xfrm>
+          <p:cNvPr id="3" name="Content Placeholder 2"/>
+          <p:cNvSpPr>
+            <a:spLocks noGrp="1"/>
+          </p:cNvSpPr>
+          <p:nvPr>
+            <p:ph idx="1"/>
+          </p:nvPr>
+        </p:nvSpPr>
+        <p:spPr>
+          <a:xfrm>
+            <a:off x="166282" y="-23633"/>
+            <a:ext cx="9918008" cy="6196359"/>
+          </a:xfrm>
+        </p:spPr>
+        <p:style>
+          <a:lnRef idx="1">
+            <a:schemeClr val="accent6"/>
+          </a:lnRef>
+          <a:fillRef idx="2">
+            <a:schemeClr val="accent6"/>
+          </a:fillRef>
+          <a:effectRef idx="1">
+            <a:schemeClr val="accent6"/>
+          </a:effectRef>
+          <a:fontRef idx="minor">
+            <a:schemeClr val="dk1"/>
+          </a:fontRef>
+        </p:style>
+        <p:txBody>
+          <a:bodyPr/>
+          <a:lstStyle/>
+          <a:p>
+            <a:pPr marL="914400" lvl="2" indent="0">
+              <a:buNone/>
+            </a:pPr>
+            <a:endParaRPr lang="en-US" dirty="0"/>
+          </a:p>
+        </p:txBody>
+      </p:sp>
+      <p:sp>
+        <p:nvSpPr>
+          <p:cNvPr id="4" name="Rounded Rectangle 3"/>
+          <p:cNvSpPr/>
+          <p:nvPr/>
+        </p:nvSpPr>
+        <p:spPr>
+          <a:xfrm>
+            <a:off x="481911" y="1523127"/>
+            <a:ext cx="2330245" cy="3893574"/>
+          </a:xfrm>
+          <a:prstGeom prst="roundRect">
+            <a:avLst/>
+          </a:prstGeom>
+        </p:spPr>
+        <p:style>
+          <a:lnRef idx="1">
+            <a:schemeClr val="accent4"/>
+          </a:lnRef>
+          <a:fillRef idx="2">
+            <a:schemeClr val="accent4"/>
+          </a:fillRef>
+          <a:effectRef idx="1">
+            <a:schemeClr val="accent4"/>
+          </a:effectRef>
+          <a:fontRef idx="minor">
+            <a:schemeClr val="dk1"/>
+          </a:fontRef>
+        </p:style>
+        <p:txBody>
+          <a:bodyPr rtlCol="0" anchor="ctr"/>
+          <a:lstStyle/>
+          <a:p>
+            <a:pPr algn="ctr"/>
+            <a:endParaRPr lang="en-US" dirty="0" smtClean="0"/>
+          </a:p>
+          <a:p>
+            <a:pPr algn="ctr"/>
+            <a:endParaRPr lang="en-US" dirty="0"/>
+          </a:p>
+          <a:p>
+            <a:pPr algn="ctr"/>
+            <a:r>
+              <a:rPr lang="en-US" dirty="0" smtClean="0"/>
+              <a:t>Soap API Gateway</a:t>
+            </a:r>
+          </a:p>
+          <a:p>
+            <a:pPr algn="ctr"/>
+            <a:r>
+              <a:rPr lang="en-US" dirty="0" smtClean="0"/>
+              <a:t>Port:8092</a:t>
+            </a:r>
+            <a:endParaRPr lang="en-US" dirty="0"/>
+          </a:p>
+          <a:p>
+            <a:pPr algn="ctr"/>
+            <a:endParaRPr lang="en-US" dirty="0"/>
+          </a:p>
+        </p:txBody>
+      </p:sp>
+      <p:sp>
+        <p:nvSpPr>
+          <p:cNvPr id="5" name="Rectangle 4"/>
+          <p:cNvSpPr/>
+          <p:nvPr/>
+        </p:nvSpPr>
+        <p:spPr>
+          <a:xfrm>
+            <a:off x="1071848" y="2710371"/>
+            <a:ext cx="1079093" cy="575187"/>
+          </a:xfrm>
+          <a:prstGeom prst="rect">
+            <a:avLst/>
+          </a:prstGeom>
+        </p:spPr>
+        <p:style>
+          <a:lnRef idx="2">
+            <a:schemeClr val="accent1">
+              <a:shade val="50000"/>
+            </a:schemeClr>
+          </a:lnRef>
+          <a:fillRef idx="1">
+            <a:schemeClr val="accent1"/>
+          </a:fillRef>
+          <a:effectRef idx="0">
+            <a:schemeClr val="accent1"/>
+          </a:effectRef>
+          <a:fontRef idx="minor">
+            <a:schemeClr val="lt1"/>
+          </a:fontRef>
+        </p:style>
+        <p:txBody>
+          <a:bodyPr rtlCol="0" anchor="ctr"/>
+          <a:lstStyle/>
+          <a:p>
+            <a:pPr algn="ctr"/>
+            <a:r>
+              <a:rPr lang="en-US" dirty="0" smtClean="0"/>
+              <a:t>Router</a:t>
+            </a:r>
+            <a:endParaRPr lang="en-US" dirty="0"/>
+          </a:p>
+        </p:txBody>
+      </p:sp>
+      <p:sp>
+        <p:nvSpPr>
+          <p:cNvPr id="6" name="Rounded Rectangle 5"/>
+          <p:cNvSpPr/>
+          <p:nvPr/>
+        </p:nvSpPr>
+        <p:spPr>
+          <a:xfrm>
+            <a:off x="3600440" y="366612"/>
+            <a:ext cx="2197510" cy="1725561"/>
+          </a:xfrm>
+          <a:prstGeom prst="roundRect">
+            <a:avLst/>
+          </a:prstGeom>
+        </p:spPr>
+        <p:style>
+          <a:lnRef idx="1">
+            <a:schemeClr val="accent4"/>
+          </a:lnRef>
+          <a:fillRef idx="2">
+            <a:schemeClr val="accent4"/>
+          </a:fillRef>
+          <a:effectRef idx="1">
+            <a:schemeClr val="accent4"/>
+          </a:effectRef>
+          <a:fontRef idx="minor">
+            <a:schemeClr val="dk1"/>
+          </a:fontRef>
+        </p:style>
+        <p:txBody>
+          <a:bodyPr rtlCol="0" anchor="ctr"/>
+          <a:lstStyle/>
+          <a:p>
+            <a:pPr algn="ctr"/>
+            <a:r>
+              <a:rPr lang="en-US" dirty="0" smtClean="0"/>
+              <a:t>Get Order Rest API</a:t>
+            </a:r>
+          </a:p>
+          <a:p>
+            <a:pPr algn="ctr"/>
+            <a:r>
+              <a:rPr lang="en-US" dirty="0" smtClean="0"/>
+              <a:t>Port:8091</a:t>
+            </a:r>
+            <a:endParaRPr lang="en-US" dirty="0"/>
+          </a:p>
+        </p:txBody>
+      </p:sp>
+      <p:sp>
+        <p:nvSpPr>
+          <p:cNvPr id="8" name="Rounded Rectangle 7"/>
+          <p:cNvSpPr/>
+          <p:nvPr/>
+        </p:nvSpPr>
+        <p:spPr>
+          <a:xfrm>
+            <a:off x="6098454" y="2266331"/>
+            <a:ext cx="2197510" cy="1725561"/>
+          </a:xfrm>
+          <a:prstGeom prst="roundRect">
+            <a:avLst/>
+          </a:prstGeom>
+        </p:spPr>
+        <p:style>
+          <a:lnRef idx="1">
+            <a:schemeClr val="accent4"/>
+          </a:lnRef>
+          <a:fillRef idx="2">
+            <a:schemeClr val="accent4"/>
+          </a:fillRef>
+          <a:effectRef idx="1">
+            <a:schemeClr val="accent4"/>
+          </a:effectRef>
+          <a:fontRef idx="minor">
+            <a:schemeClr val="dk1"/>
+          </a:fontRef>
+        </p:style>
+        <p:txBody>
+          <a:bodyPr rtlCol="0" anchor="ctr"/>
+          <a:lstStyle/>
+          <a:p>
+            <a:pPr algn="ctr"/>
+            <a:r>
+              <a:rPr lang="en-US" dirty="0" smtClean="0"/>
+              <a:t>Post Order Rest API</a:t>
+            </a:r>
+          </a:p>
+          <a:p>
+            <a:pPr algn="ctr"/>
+            <a:r>
+              <a:rPr lang="en-US" dirty="0" smtClean="0"/>
+              <a:t>Port:8095</a:t>
+            </a:r>
+            <a:endParaRPr lang="en-US" dirty="0"/>
+          </a:p>
+          <a:p>
+            <a:pPr algn="ctr"/>
+            <a:endParaRPr lang="en-US" dirty="0"/>
+          </a:p>
+        </p:txBody>
+      </p:sp>
+      <p:sp>
+        <p:nvSpPr>
+          <p:cNvPr id="9" name="Rounded Rectangle 8"/>
+          <p:cNvSpPr/>
+          <p:nvPr/>
+        </p:nvSpPr>
+        <p:spPr>
+          <a:xfrm>
+            <a:off x="3545935" y="4399062"/>
+            <a:ext cx="2197510" cy="1725561"/>
+          </a:xfrm>
+          <a:prstGeom prst="roundRect">
+            <a:avLst/>
+          </a:prstGeom>
+        </p:spPr>
+        <p:style>
+          <a:lnRef idx="1">
+            <a:schemeClr val="accent4"/>
+          </a:lnRef>
+          <a:fillRef idx="2">
+            <a:schemeClr val="accent4"/>
+          </a:fillRef>
+          <a:effectRef idx="1">
+            <a:schemeClr val="accent4"/>
+          </a:effectRef>
+          <a:fontRef idx="minor">
+            <a:schemeClr val="dk1"/>
+          </a:fontRef>
+        </p:style>
+        <p:txBody>
+          <a:bodyPr rtlCol="0" anchor="ctr"/>
+          <a:lstStyle/>
+          <a:p>
+            <a:pPr algn="ctr"/>
+            <a:r>
+              <a:rPr lang="en-US" dirty="0" smtClean="0"/>
+              <a:t>Put Order Rest API</a:t>
+            </a:r>
+          </a:p>
+          <a:p>
+            <a:pPr algn="ctr"/>
+            <a:r>
+              <a:rPr lang="en-US" dirty="0" smtClean="0"/>
+              <a:t>Port:8093</a:t>
+            </a:r>
+            <a:endParaRPr lang="en-US" dirty="0"/>
+          </a:p>
+          <a:p>
+            <a:pPr algn="ctr"/>
+            <a:endParaRPr lang="en-US" dirty="0"/>
+          </a:p>
+        </p:txBody>
+      </p:sp>
+      <p:sp>
+        <p:nvSpPr>
+          <p:cNvPr id="10" name="Rounded Rectangle 9"/>
+          <p:cNvSpPr/>
+          <p:nvPr/>
+        </p:nvSpPr>
+        <p:spPr>
+          <a:xfrm>
+            <a:off x="7218780" y="4156475"/>
+            <a:ext cx="2197510" cy="1990593"/>
+          </a:xfrm>
+          <a:prstGeom prst="roundRect">
+            <a:avLst/>
+          </a:prstGeom>
+        </p:spPr>
+        <p:style>
+          <a:lnRef idx="1">
+            <a:schemeClr val="accent4"/>
+          </a:lnRef>
+          <a:fillRef idx="2">
+            <a:schemeClr val="accent4"/>
+          </a:fillRef>
+          <a:effectRef idx="1">
+            <a:schemeClr val="accent4"/>
+          </a:effectRef>
+          <a:fontRef idx="minor">
+            <a:schemeClr val="dk1"/>
+          </a:fontRef>
+        </p:style>
+        <p:txBody>
+          <a:bodyPr rtlCol="0" anchor="ctr"/>
+          <a:lstStyle/>
+          <a:p>
+            <a:pPr algn="ctr"/>
+            <a:r>
+              <a:rPr lang="en-US" dirty="0"/>
+              <a:t>Order </a:t>
+            </a:r>
+            <a:r>
+              <a:rPr lang="en-US" dirty="0" smtClean="0"/>
+              <a:t>Processor &amp;Notification </a:t>
+            </a:r>
+            <a:endParaRPr lang="en-US" dirty="0" smtClean="0"/>
+          </a:p>
+          <a:p>
+            <a:pPr algn="ctr"/>
+            <a:r>
+              <a:rPr lang="en-US" dirty="0" smtClean="0"/>
+              <a:t>Port:8094</a:t>
+            </a:r>
+            <a:endParaRPr lang="en-US" dirty="0"/>
+          </a:p>
+          <a:p>
+            <a:pPr algn="ctr"/>
+            <a:endParaRPr lang="en-US" dirty="0"/>
+          </a:p>
+        </p:txBody>
+      </p:sp>
+      <p:sp>
+        <p:nvSpPr>
+          <p:cNvPr id="11" name="Flowchart: Predefined Process 10"/>
+          <p:cNvSpPr/>
+          <p:nvPr/>
+        </p:nvSpPr>
+        <p:spPr>
+          <a:xfrm>
+            <a:off x="3904017" y="3582748"/>
+            <a:ext cx="1601428" cy="467621"/>
+          </a:xfrm>
+          <a:prstGeom prst="flowChartPredefinedProcess">
+            <a:avLst/>
+          </a:prstGeom>
         </p:spPr>
         <p:style>
           <a:lnRef idx="2">
@@ -3427,129 +3800,97 @@
           </a:fontRef>
         </p:style>
         <p:txBody>
-          <a:bodyPr>
-            <a:normAutofit fontScale="90000"/>
-          </a:bodyPr>
-          <a:lstStyle/>
-          <a:p>
-            <a:endParaRPr lang="en-US" dirty="0"/>
-          </a:p>
-        </p:txBody>
-      </p:sp>
-      <p:sp>
-        <p:nvSpPr>
-          <p:cNvPr id="3" name="Content Placeholder 2"/>
-          <p:cNvSpPr>
-            <a:spLocks noGrp="1"/>
-          </p:cNvSpPr>
-          <p:nvPr>
-            <p:ph idx="1"/>
-          </p:nvPr>
-        </p:nvSpPr>
-        <p:spPr>
-          <a:xfrm>
-            <a:off x="130277" y="1031437"/>
-            <a:ext cx="10515600" cy="5032375"/>
-          </a:xfrm>
+          <a:bodyPr rtlCol="0" anchor="ctr"/>
+          <a:lstStyle/>
+          <a:p>
+            <a:pPr algn="ctr"/>
+            <a:r>
+              <a:rPr lang="en-US" sz="1000" b="1" dirty="0" smtClean="0"/>
+              <a:t>Active MQ</a:t>
+            </a:r>
+          </a:p>
+          <a:p>
+            <a:pPr algn="ctr"/>
+            <a:r>
+              <a:rPr lang="en-US" sz="900" dirty="0" smtClean="0"/>
+              <a:t>Queue://Order</a:t>
+            </a:r>
+          </a:p>
+          <a:p>
+            <a:pPr algn="ctr"/>
+            <a:r>
+              <a:rPr lang="en-US" sz="900" dirty="0" smtClean="0"/>
+              <a:t>Queue://ordernotify</a:t>
+            </a:r>
+            <a:endParaRPr lang="en-US" sz="900" dirty="0"/>
+          </a:p>
+        </p:txBody>
+      </p:sp>
+      <p:sp>
+        <p:nvSpPr>
+          <p:cNvPr id="12" name="Flowchart: Magnetic Disk 11"/>
+          <p:cNvSpPr/>
+          <p:nvPr/>
+        </p:nvSpPr>
+        <p:spPr>
+          <a:xfrm>
+            <a:off x="10388168" y="2498185"/>
+            <a:ext cx="914400" cy="1124977"/>
+          </a:xfrm>
+          <a:prstGeom prst="flowChartMagneticDisk">
+            <a:avLst/>
+          </a:prstGeom>
         </p:spPr>
         <p:style>
-          <a:lnRef idx="2">
-            <a:schemeClr val="accent6"/>
+          <a:lnRef idx="1">
+            <a:schemeClr val="accent3"/>
           </a:lnRef>
-          <a:fillRef idx="1">
-            <a:schemeClr val="lt1"/>
+          <a:fillRef idx="2">
+            <a:schemeClr val="accent3"/>
           </a:fillRef>
-          <a:effectRef idx="0">
-            <a:schemeClr val="accent6"/>
+          <a:effectRef idx="1">
+            <a:schemeClr val="accent3"/>
           </a:effectRef>
           <a:fontRef idx="minor">
             <a:schemeClr val="dk1"/>
           </a:fontRef>
         </p:style>
         <p:txBody>
-          <a:bodyPr/>
-          <a:lstStyle/>
-          <a:p>
-            <a:pPr marL="914400" lvl="2" indent="0">
-              <a:buNone/>
-            </a:pPr>
+          <a:bodyPr rtlCol="0" anchor="ctr"/>
+          <a:lstStyle/>
+          <a:p>
+            <a:pPr algn="ctr"/>
+            <a:r>
+              <a:rPr lang="en-US" dirty="0" smtClean="0"/>
+              <a:t>H2:</a:t>
+            </a:r>
+          </a:p>
+          <a:p>
+            <a:pPr algn="ctr"/>
+            <a:r>
+              <a:rPr lang="en-US" dirty="0" smtClean="0"/>
+              <a:t>Order </a:t>
+            </a:r>
+            <a:r>
+              <a:rPr lang="en-US" dirty="0"/>
+              <a:t>DB</a:t>
+            </a:r>
             <a:endParaRPr lang="en-US" dirty="0"/>
           </a:p>
         </p:txBody>
       </p:sp>
       <p:sp>
         <p:nvSpPr>
-          <p:cNvPr id="4" name="Rounded Rectangle 3"/>
+          <p:cNvPr id="13" name="Flowchart: Connector 12"/>
           <p:cNvSpPr/>
           <p:nvPr/>
         </p:nvSpPr>
         <p:spPr>
           <a:xfrm>
-            <a:off x="766915" y="1740310"/>
-            <a:ext cx="2330245" cy="3893574"/>
-          </a:xfrm>
-          <a:prstGeom prst="roundRect">
-            <a:avLst/>
-          </a:prstGeom>
-        </p:spPr>
-        <p:style>
-          <a:lnRef idx="2">
-            <a:schemeClr val="accent6"/>
-          </a:lnRef>
-          <a:fillRef idx="1">
-            <a:schemeClr val="lt1"/>
-          </a:fillRef>
-          <a:effectRef idx="0">
-            <a:schemeClr val="accent6"/>
-          </a:effectRef>
-          <a:fontRef idx="minor">
-            <a:schemeClr val="dk1"/>
-          </a:fontRef>
-        </p:style>
-        <p:txBody>
-          <a:bodyPr rtlCol="0" anchor="ctr"/>
-          <a:lstStyle/>
-          <a:p>
-            <a:pPr algn="ctr"/>
-            <a:endParaRPr lang="en-US" dirty="0" smtClean="0"/>
-          </a:p>
-          <a:p>
-            <a:pPr algn="ctr"/>
-            <a:endParaRPr lang="en-US" dirty="0"/>
-          </a:p>
-          <a:p>
-            <a:pPr algn="ctr"/>
-            <a:r>
-              <a:rPr lang="en-US" dirty="0" smtClean="0"/>
-              <a:t>Soap API Gateway</a:t>
-            </a:r>
-          </a:p>
-          <a:p>
-            <a:pPr algn="ctr"/>
-            <a:r>
-              <a:rPr lang="en-US" dirty="0" smtClean="0"/>
-              <a:t>Port:8092</a:t>
-            </a:r>
-            <a:endParaRPr lang="en-US" dirty="0"/>
-          </a:p>
-          <a:p>
-            <a:pPr algn="ctr"/>
-            <a:endParaRPr lang="en-US" dirty="0"/>
-          </a:p>
-        </p:txBody>
-      </p:sp>
-      <p:sp>
-        <p:nvSpPr>
-          <p:cNvPr id="5" name="Rectangle 4"/>
-          <p:cNvSpPr/>
-          <p:nvPr/>
-        </p:nvSpPr>
-        <p:spPr>
-          <a:xfrm>
-            <a:off x="1356852" y="2927554"/>
-            <a:ext cx="1079093" cy="575187"/>
-          </a:xfrm>
-          <a:prstGeom prst="rect">
+            <a:off x="3114975" y="876808"/>
+            <a:ext cx="636636" cy="501372"/>
+          </a:xfrm>
+          <a:prstGeom prst="flowChartConnector">
             <a:avLst/>
           </a:prstGeom>
         </p:spPr>
@@ -3575,329 +3916,23 @@
           <a:p>
             <a:pPr algn="ctr"/>
             <a:r>
-              <a:rPr lang="en-US" dirty="0" smtClean="0"/>
-              <a:t>Router</a:t>
-            </a:r>
-            <a:endParaRPr lang="en-US" dirty="0"/>
-          </a:p>
-        </p:txBody>
-      </p:sp>
-      <p:sp>
-        <p:nvSpPr>
-          <p:cNvPr id="6" name="Rounded Rectangle 5"/>
+              <a:rPr lang="en-US" sz="800" dirty="0" smtClean="0"/>
+              <a:t>Rest</a:t>
+            </a:r>
+            <a:endParaRPr lang="en-US" sz="800" dirty="0"/>
+          </a:p>
+        </p:txBody>
+      </p:sp>
+      <p:sp>
+        <p:nvSpPr>
+          <p:cNvPr id="16" name="Flowchart: Connector 15"/>
           <p:cNvSpPr/>
           <p:nvPr/>
         </p:nvSpPr>
         <p:spPr>
           <a:xfrm>
-            <a:off x="4039827" y="459811"/>
-            <a:ext cx="2197510" cy="1725561"/>
-          </a:xfrm>
-          <a:prstGeom prst="roundRect">
-            <a:avLst/>
-          </a:prstGeom>
-        </p:spPr>
-        <p:style>
-          <a:lnRef idx="2">
-            <a:schemeClr val="accent6"/>
-          </a:lnRef>
-          <a:fillRef idx="1">
-            <a:schemeClr val="lt1"/>
-          </a:fillRef>
-          <a:effectRef idx="0">
-            <a:schemeClr val="accent6"/>
-          </a:effectRef>
-          <a:fontRef idx="minor">
-            <a:schemeClr val="dk1"/>
-          </a:fontRef>
-        </p:style>
-        <p:txBody>
-          <a:bodyPr rtlCol="0" anchor="ctr"/>
-          <a:lstStyle/>
-          <a:p>
-            <a:pPr algn="ctr"/>
-            <a:r>
-              <a:rPr lang="en-US" dirty="0" smtClean="0"/>
-              <a:t>Get Order Rest API</a:t>
-            </a:r>
-          </a:p>
-          <a:p>
-            <a:pPr algn="ctr"/>
-            <a:r>
-              <a:rPr lang="en-US" dirty="0" smtClean="0"/>
-              <a:t>Port:8091</a:t>
-            </a:r>
-            <a:endParaRPr lang="en-US" dirty="0"/>
-          </a:p>
-        </p:txBody>
-      </p:sp>
-      <p:sp>
-        <p:nvSpPr>
-          <p:cNvPr id="8" name="Rounded Rectangle 7"/>
-          <p:cNvSpPr/>
-          <p:nvPr/>
-        </p:nvSpPr>
-        <p:spPr>
-          <a:xfrm>
-            <a:off x="6098454" y="2483514"/>
-            <a:ext cx="2197510" cy="1725561"/>
-          </a:xfrm>
-          <a:prstGeom prst="roundRect">
-            <a:avLst/>
-          </a:prstGeom>
-        </p:spPr>
-        <p:style>
-          <a:lnRef idx="2">
-            <a:schemeClr val="accent6"/>
-          </a:lnRef>
-          <a:fillRef idx="1">
-            <a:schemeClr val="lt1"/>
-          </a:fillRef>
-          <a:effectRef idx="0">
-            <a:schemeClr val="accent6"/>
-          </a:effectRef>
-          <a:fontRef idx="minor">
-            <a:schemeClr val="dk1"/>
-          </a:fontRef>
-        </p:style>
-        <p:txBody>
-          <a:bodyPr rtlCol="0" anchor="ctr"/>
-          <a:lstStyle/>
-          <a:p>
-            <a:pPr algn="ctr"/>
-            <a:r>
-              <a:rPr lang="en-US" dirty="0" smtClean="0"/>
-              <a:t>Post Order Rest API</a:t>
-            </a:r>
-          </a:p>
-          <a:p>
-            <a:pPr algn="ctr"/>
-            <a:r>
-              <a:rPr lang="en-US" dirty="0" smtClean="0"/>
-              <a:t>Port:8095</a:t>
-            </a:r>
-            <a:endParaRPr lang="en-US" dirty="0"/>
-          </a:p>
-          <a:p>
-            <a:pPr algn="ctr"/>
-            <a:endParaRPr lang="en-US" dirty="0"/>
-          </a:p>
-        </p:txBody>
-      </p:sp>
-      <p:sp>
-        <p:nvSpPr>
-          <p:cNvPr id="9" name="Rounded Rectangle 8"/>
-          <p:cNvSpPr/>
-          <p:nvPr/>
-        </p:nvSpPr>
-        <p:spPr>
-          <a:xfrm>
-            <a:off x="3937819" y="4616245"/>
-            <a:ext cx="2197510" cy="1725561"/>
-          </a:xfrm>
-          <a:prstGeom prst="roundRect">
-            <a:avLst/>
-          </a:prstGeom>
-        </p:spPr>
-        <p:style>
-          <a:lnRef idx="2">
-            <a:schemeClr val="accent6"/>
-          </a:lnRef>
-          <a:fillRef idx="1">
-            <a:schemeClr val="lt1"/>
-          </a:fillRef>
-          <a:effectRef idx="0">
-            <a:schemeClr val="accent6"/>
-          </a:effectRef>
-          <a:fontRef idx="minor">
-            <a:schemeClr val="dk1"/>
-          </a:fontRef>
-        </p:style>
-        <p:txBody>
-          <a:bodyPr rtlCol="0" anchor="ctr"/>
-          <a:lstStyle/>
-          <a:p>
-            <a:pPr algn="ctr"/>
-            <a:r>
-              <a:rPr lang="en-US" dirty="0" smtClean="0"/>
-              <a:t>Put Order Rest API</a:t>
-            </a:r>
-          </a:p>
-          <a:p>
-            <a:pPr algn="ctr"/>
-            <a:r>
-              <a:rPr lang="en-US" dirty="0" smtClean="0"/>
-              <a:t>Port:8093</a:t>
-            </a:r>
-            <a:endParaRPr lang="en-US" dirty="0"/>
-          </a:p>
-          <a:p>
-            <a:pPr algn="ctr"/>
-            <a:endParaRPr lang="en-US" dirty="0"/>
-          </a:p>
-        </p:txBody>
-      </p:sp>
-      <p:sp>
-        <p:nvSpPr>
-          <p:cNvPr id="10" name="Rounded Rectangle 9"/>
-          <p:cNvSpPr/>
-          <p:nvPr/>
-        </p:nvSpPr>
-        <p:spPr>
-          <a:xfrm>
-            <a:off x="7800666" y="4254908"/>
-            <a:ext cx="2197510" cy="1990593"/>
-          </a:xfrm>
-          <a:prstGeom prst="roundRect">
-            <a:avLst/>
-          </a:prstGeom>
-        </p:spPr>
-        <p:style>
-          <a:lnRef idx="2">
-            <a:schemeClr val="accent6"/>
-          </a:lnRef>
-          <a:fillRef idx="1">
-            <a:schemeClr val="lt1"/>
-          </a:fillRef>
-          <a:effectRef idx="0">
-            <a:schemeClr val="accent6"/>
-          </a:effectRef>
-          <a:fontRef idx="minor">
-            <a:schemeClr val="dk1"/>
-          </a:fontRef>
-        </p:style>
-        <p:txBody>
-          <a:bodyPr rtlCol="0" anchor="ctr"/>
-          <a:lstStyle/>
-          <a:p>
-            <a:pPr algn="ctr"/>
-            <a:r>
-              <a:rPr lang="en-US" dirty="0" smtClean="0"/>
-              <a:t>Notification Processor</a:t>
-            </a:r>
-          </a:p>
-          <a:p>
-            <a:pPr algn="ctr"/>
-            <a:r>
-              <a:rPr lang="en-US" dirty="0" smtClean="0"/>
-              <a:t>Port:8094</a:t>
-            </a:r>
-            <a:endParaRPr lang="en-US" dirty="0"/>
-          </a:p>
-          <a:p>
-            <a:pPr algn="ctr"/>
-            <a:endParaRPr lang="en-US" dirty="0"/>
-          </a:p>
-        </p:txBody>
-      </p:sp>
-      <p:sp>
-        <p:nvSpPr>
-          <p:cNvPr id="11" name="Flowchart: Predefined Process 10"/>
-          <p:cNvSpPr/>
-          <p:nvPr/>
-        </p:nvSpPr>
-        <p:spPr>
-          <a:xfrm>
-            <a:off x="7028829" y="0"/>
-            <a:ext cx="2231927" cy="1317369"/>
-          </a:xfrm>
-          <a:prstGeom prst="flowChartPredefinedProcess">
-            <a:avLst/>
-          </a:prstGeom>
-        </p:spPr>
-        <p:style>
-          <a:lnRef idx="2">
-            <a:schemeClr val="accent6"/>
-          </a:lnRef>
-          <a:fillRef idx="1">
-            <a:schemeClr val="lt1"/>
-          </a:fillRef>
-          <a:effectRef idx="0">
-            <a:schemeClr val="accent6"/>
-          </a:effectRef>
-          <a:fontRef idx="minor">
-            <a:schemeClr val="dk1"/>
-          </a:fontRef>
-        </p:style>
-        <p:txBody>
-          <a:bodyPr rtlCol="0" anchor="ctr"/>
-          <a:lstStyle/>
-          <a:p>
-            <a:pPr algn="ctr"/>
-            <a:r>
-              <a:rPr lang="en-US" sz="1000" b="1" dirty="0" smtClean="0"/>
-              <a:t>Active MQ</a:t>
-            </a:r>
-          </a:p>
-          <a:p>
-            <a:pPr algn="ctr"/>
-            <a:r>
-              <a:rPr lang="en-US" sz="900" dirty="0" smtClean="0"/>
-              <a:t>Queue://Order</a:t>
-            </a:r>
-          </a:p>
-          <a:p>
-            <a:pPr algn="ctr"/>
-            <a:r>
-              <a:rPr lang="en-US" sz="900" dirty="0" smtClean="0"/>
-              <a:t>Queue://ordernotify</a:t>
-            </a:r>
-            <a:endParaRPr lang="en-US" sz="900" dirty="0"/>
-          </a:p>
-        </p:txBody>
-      </p:sp>
-      <p:sp>
-        <p:nvSpPr>
-          <p:cNvPr id="12" name="Flowchart: Magnetic Disk 11"/>
-          <p:cNvSpPr/>
-          <p:nvPr/>
-        </p:nvSpPr>
-        <p:spPr>
-          <a:xfrm>
-            <a:off x="9099755" y="2035276"/>
-            <a:ext cx="914400" cy="1124977"/>
-          </a:xfrm>
-          <a:prstGeom prst="flowChartMagneticDisk">
-            <a:avLst/>
-          </a:prstGeom>
-        </p:spPr>
-        <p:style>
-          <a:lnRef idx="2">
-            <a:schemeClr val="accent6"/>
-          </a:lnRef>
-          <a:fillRef idx="1">
-            <a:schemeClr val="lt1"/>
-          </a:fillRef>
-          <a:effectRef idx="0">
-            <a:schemeClr val="accent6"/>
-          </a:effectRef>
-          <a:fontRef idx="minor">
-            <a:schemeClr val="dk1"/>
-          </a:fontRef>
-        </p:style>
-        <p:txBody>
-          <a:bodyPr rtlCol="0" anchor="ctr"/>
-          <a:lstStyle/>
-          <a:p>
-            <a:pPr algn="ctr"/>
-            <a:r>
-              <a:rPr lang="en-US" dirty="0" smtClean="0"/>
-              <a:t>Order DB</a:t>
-            </a:r>
-            <a:endParaRPr lang="en-US" dirty="0"/>
-          </a:p>
-        </p:txBody>
-      </p:sp>
-      <p:sp>
-        <p:nvSpPr>
-          <p:cNvPr id="13" name="Flowchart: Connector 12"/>
-          <p:cNvSpPr/>
-          <p:nvPr/>
-        </p:nvSpPr>
-        <p:spPr>
-          <a:xfrm>
-            <a:off x="3554362" y="1093991"/>
-            <a:ext cx="636636" cy="501372"/>
+            <a:off x="206610" y="3129112"/>
+            <a:ext cx="503901" cy="457200"/>
           </a:xfrm>
           <a:prstGeom prst="flowChartConnector">
             <a:avLst/>
@@ -3925,23 +3960,23 @@
           <a:p>
             <a:pPr algn="ctr"/>
             <a:r>
-              <a:rPr lang="en-US" sz="800" dirty="0" smtClean="0"/>
-              <a:t>Rest</a:t>
-            </a:r>
-            <a:endParaRPr lang="en-US" sz="800" dirty="0"/>
-          </a:p>
-        </p:txBody>
-      </p:sp>
-      <p:sp>
-        <p:nvSpPr>
-          <p:cNvPr id="16" name="Flowchart: Connector 15"/>
+              <a:rPr lang="en-US" sz="1000" dirty="0" err="1" smtClean="0"/>
+              <a:t>cxf</a:t>
+            </a:r>
+            <a:endParaRPr lang="en-US" sz="1000" dirty="0"/>
+          </a:p>
+        </p:txBody>
+      </p:sp>
+      <p:sp>
+        <p:nvSpPr>
+          <p:cNvPr id="17" name="Flowchart: Connector 16"/>
           <p:cNvSpPr/>
           <p:nvPr/>
         </p:nvSpPr>
         <p:spPr>
           <a:xfrm>
-            <a:off x="491614" y="3346295"/>
-            <a:ext cx="503901" cy="457200"/>
+            <a:off x="2384061" y="2149527"/>
+            <a:ext cx="715295" cy="457200"/>
           </a:xfrm>
           <a:prstGeom prst="flowChartConnector">
             <a:avLst/>
@@ -3969,23 +4004,23 @@
           <a:p>
             <a:pPr algn="ctr"/>
             <a:r>
-              <a:rPr lang="en-US" sz="1000" dirty="0" err="1" smtClean="0"/>
-              <a:t>cxf</a:t>
-            </a:r>
-            <a:endParaRPr lang="en-US" sz="1000" dirty="0"/>
-          </a:p>
-        </p:txBody>
-      </p:sp>
-      <p:sp>
-        <p:nvSpPr>
-          <p:cNvPr id="17" name="Flowchart: Connector 16"/>
+              <a:rPr lang="en-US" sz="900" dirty="0" smtClean="0"/>
+              <a:t>http4</a:t>
+            </a:r>
+            <a:endParaRPr lang="en-US" sz="900" dirty="0"/>
+          </a:p>
+        </p:txBody>
+      </p:sp>
+      <p:sp>
+        <p:nvSpPr>
+          <p:cNvPr id="21" name="Flowchart: Connector 20"/>
           <p:cNvSpPr/>
           <p:nvPr/>
         </p:nvSpPr>
         <p:spPr>
           <a:xfrm>
-            <a:off x="2657166" y="2380276"/>
-            <a:ext cx="715295" cy="457200"/>
+            <a:off x="5659067" y="876808"/>
+            <a:ext cx="624347" cy="457200"/>
           </a:xfrm>
           <a:prstGeom prst="flowChartConnector">
             <a:avLst/>
@@ -4014,7 +4049,7 @@
             <a:pPr algn="ctr"/>
             <a:r>
               <a:rPr lang="en-US" sz="900" dirty="0" smtClean="0"/>
-              <a:t>http4</a:t>
+              <a:t>SQL</a:t>
             </a:r>
             <a:endParaRPr lang="en-US" sz="900" dirty="0"/>
           </a:p>
@@ -4022,14 +4057,14 @@
       </p:sp>
       <p:sp>
         <p:nvSpPr>
-          <p:cNvPr id="21" name="Flowchart: Connector 20"/>
+          <p:cNvPr id="22" name="Flowchart: Connector 21"/>
           <p:cNvSpPr/>
           <p:nvPr/>
         </p:nvSpPr>
         <p:spPr>
           <a:xfrm>
-            <a:off x="6098454" y="1093991"/>
-            <a:ext cx="624347" cy="457200"/>
+            <a:off x="8030489" y="2448020"/>
+            <a:ext cx="512510" cy="457200"/>
           </a:xfrm>
           <a:prstGeom prst="flowChartConnector">
             <a:avLst/>
@@ -4058,7 +4093,7 @@
             <a:pPr algn="ctr"/>
             <a:r>
               <a:rPr lang="en-US" sz="900" dirty="0" smtClean="0"/>
-              <a:t>SQL</a:t>
+              <a:t>JPA</a:t>
             </a:r>
             <a:endParaRPr lang="en-US" sz="900" dirty="0"/>
           </a:p>
@@ -4066,14 +4101,14 @@
       </p:sp>
       <p:sp>
         <p:nvSpPr>
-          <p:cNvPr id="22" name="Flowchart: Connector 21"/>
+          <p:cNvPr id="23" name="Flowchart: Connector 22"/>
           <p:cNvSpPr/>
           <p:nvPr/>
         </p:nvSpPr>
         <p:spPr>
           <a:xfrm>
-            <a:off x="8030489" y="2665203"/>
-            <a:ext cx="512510" cy="457200"/>
+            <a:off x="5490265" y="4900506"/>
+            <a:ext cx="651385" cy="457200"/>
           </a:xfrm>
           <a:prstGeom prst="flowChartConnector">
             <a:avLst/>
@@ -4102,7 +4137,7 @@
             <a:pPr algn="ctr"/>
             <a:r>
               <a:rPr lang="en-US" sz="900" dirty="0" smtClean="0"/>
-              <a:t>JPA</a:t>
+              <a:t>AMQ</a:t>
             </a:r>
             <a:endParaRPr lang="en-US" sz="900" dirty="0"/>
           </a:p>
@@ -4110,14 +4145,14 @@
       </p:sp>
       <p:sp>
         <p:nvSpPr>
-          <p:cNvPr id="23" name="Flowchart: Connector 22"/>
+          <p:cNvPr id="32" name="Flowchart: Connector 31"/>
           <p:cNvSpPr/>
           <p:nvPr/>
         </p:nvSpPr>
         <p:spPr>
           <a:xfrm>
-            <a:off x="5882149" y="5117689"/>
-            <a:ext cx="651385" cy="457200"/>
+            <a:off x="2437300" y="3191359"/>
+            <a:ext cx="715295" cy="457200"/>
           </a:xfrm>
           <a:prstGeom prst="flowChartConnector">
             <a:avLst/>
@@ -4146,7 +4181,7 @@
             <a:pPr algn="ctr"/>
             <a:r>
               <a:rPr lang="en-US" sz="900" dirty="0" smtClean="0"/>
-              <a:t>AMQ</a:t>
+              <a:t>http4</a:t>
             </a:r>
             <a:endParaRPr lang="en-US" sz="900" dirty="0"/>
           </a:p>
@@ -4154,13 +4189,13 @@
       </p:sp>
       <p:sp>
         <p:nvSpPr>
-          <p:cNvPr id="32" name="Flowchart: Connector 31"/>
+          <p:cNvPr id="33" name="Flowchart: Connector 32"/>
           <p:cNvSpPr/>
           <p:nvPr/>
         </p:nvSpPr>
         <p:spPr>
           <a:xfrm>
-            <a:off x="2722304" y="3408542"/>
+            <a:off x="2415180" y="4381932"/>
             <a:ext cx="715295" cy="457200"/>
           </a:xfrm>
           <a:prstGeom prst="flowChartConnector">
@@ -4198,14 +4233,14 @@
       </p:sp>
       <p:sp>
         <p:nvSpPr>
-          <p:cNvPr id="33" name="Flowchart: Connector 32"/>
+          <p:cNvPr id="35" name="Flowchart: Connector 34"/>
           <p:cNvSpPr/>
           <p:nvPr/>
         </p:nvSpPr>
         <p:spPr>
           <a:xfrm>
-            <a:off x="2700184" y="4599115"/>
-            <a:ext cx="715295" cy="457200"/>
+            <a:off x="8056302" y="3431454"/>
+            <a:ext cx="624347" cy="457200"/>
           </a:xfrm>
           <a:prstGeom prst="flowChartConnector">
             <a:avLst/>
@@ -4234,7 +4269,7 @@
             <a:pPr algn="ctr"/>
             <a:r>
               <a:rPr lang="en-US" sz="900" dirty="0" smtClean="0"/>
-              <a:t>http4</a:t>
+              <a:t>SQL</a:t>
             </a:r>
             <a:endParaRPr lang="en-US" sz="900" dirty="0"/>
           </a:p>
@@ -4242,13 +4277,13 @@
       </p:sp>
       <p:sp>
         <p:nvSpPr>
-          <p:cNvPr id="35" name="Flowchart: Connector 34"/>
+          <p:cNvPr id="36" name="Flowchart: Connector 35"/>
           <p:cNvSpPr/>
           <p:nvPr/>
         </p:nvSpPr>
         <p:spPr>
           <a:xfrm>
-            <a:off x="8056302" y="3648637"/>
+            <a:off x="6815658" y="4259713"/>
             <a:ext cx="624347" cy="457200"/>
           </a:xfrm>
           <a:prstGeom prst="flowChartConnector">
@@ -4286,13 +4321,13 @@
       </p:sp>
       <p:sp>
         <p:nvSpPr>
-          <p:cNvPr id="36" name="Flowchart: Connector 35"/>
+          <p:cNvPr id="37" name="Flowchart: Connector 36"/>
           <p:cNvSpPr/>
           <p:nvPr/>
         </p:nvSpPr>
         <p:spPr>
           <a:xfrm>
-            <a:off x="7397544" y="4358146"/>
+            <a:off x="9048811" y="5237908"/>
             <a:ext cx="624347" cy="457200"/>
           </a:xfrm>
           <a:prstGeom prst="flowChartConnector">
@@ -4330,14 +4365,14 @@
       </p:sp>
       <p:sp>
         <p:nvSpPr>
-          <p:cNvPr id="37" name="Flowchart: Connector 36"/>
+          <p:cNvPr id="38" name="Flowchart: Connector 37"/>
           <p:cNvSpPr/>
           <p:nvPr/>
         </p:nvSpPr>
         <p:spPr>
           <a:xfrm>
-            <a:off x="9630697" y="5336341"/>
-            <a:ext cx="624347" cy="457200"/>
+            <a:off x="9048811" y="4398596"/>
+            <a:ext cx="651385" cy="457200"/>
           </a:xfrm>
           <a:prstGeom prst="flowChartConnector">
             <a:avLst/>
@@ -4366,7 +4401,7 @@
             <a:pPr algn="ctr"/>
             <a:r>
               <a:rPr lang="en-US" sz="900" dirty="0" smtClean="0"/>
-              <a:t>SQL</a:t>
+              <a:t>AMQ</a:t>
             </a:r>
             <a:endParaRPr lang="en-US" sz="900" dirty="0"/>
           </a:p>
@@ -4374,14 +4409,14 @@
       </p:sp>
       <p:sp>
         <p:nvSpPr>
-          <p:cNvPr id="38" name="Flowchart: Connector 37"/>
+          <p:cNvPr id="39" name="Flowchart: Connector 38"/>
           <p:cNvSpPr/>
           <p:nvPr/>
         </p:nvSpPr>
         <p:spPr>
           <a:xfrm>
-            <a:off x="9630697" y="4497029"/>
-            <a:ext cx="651385" cy="457200"/>
+            <a:off x="5780139" y="2371461"/>
+            <a:ext cx="636636" cy="501372"/>
           </a:xfrm>
           <a:prstGeom prst="flowChartConnector">
             <a:avLst/>
@@ -4409,22 +4444,22 @@
           <a:p>
             <a:pPr algn="ctr"/>
             <a:r>
-              <a:rPr lang="en-US" sz="900" dirty="0" smtClean="0"/>
-              <a:t>AMQ</a:t>
-            </a:r>
-            <a:endParaRPr lang="en-US" sz="900" dirty="0"/>
-          </a:p>
-        </p:txBody>
-      </p:sp>
-      <p:sp>
-        <p:nvSpPr>
-          <p:cNvPr id="39" name="Flowchart: Connector 38"/>
+              <a:rPr lang="en-US" sz="800" dirty="0" smtClean="0"/>
+              <a:t>Rest</a:t>
+            </a:r>
+            <a:endParaRPr lang="en-US" sz="800" dirty="0"/>
+          </a:p>
+        </p:txBody>
+      </p:sp>
+      <p:sp>
+        <p:nvSpPr>
+          <p:cNvPr id="40" name="Flowchart: Connector 39"/>
           <p:cNvSpPr/>
           <p:nvPr/>
         </p:nvSpPr>
         <p:spPr>
           <a:xfrm>
-            <a:off x="5780139" y="2588644"/>
+            <a:off x="3162478" y="4900505"/>
             <a:ext cx="636636" cy="501372"/>
           </a:xfrm>
           <a:prstGeom prst="flowChartConnector">
@@ -4462,14 +4497,14 @@
       </p:sp>
       <p:sp>
         <p:nvSpPr>
-          <p:cNvPr id="40" name="Flowchart: Connector 39"/>
+          <p:cNvPr id="42" name="Flowchart: Connector 41"/>
           <p:cNvSpPr/>
           <p:nvPr/>
         </p:nvSpPr>
         <p:spPr>
           <a:xfrm>
-            <a:off x="3554362" y="5117688"/>
-            <a:ext cx="636636" cy="501372"/>
+            <a:off x="5724832" y="3445290"/>
+            <a:ext cx="651385" cy="457200"/>
           </a:xfrm>
           <a:prstGeom prst="flowChartConnector">
             <a:avLst/>
@@ -4497,23 +4532,23 @@
           <a:p>
             <a:pPr algn="ctr"/>
             <a:r>
-              <a:rPr lang="en-US" sz="800" dirty="0" smtClean="0"/>
-              <a:t>Rest</a:t>
-            </a:r>
-            <a:endParaRPr lang="en-US" sz="800" dirty="0"/>
-          </a:p>
-        </p:txBody>
-      </p:sp>
-      <p:sp>
-        <p:nvSpPr>
-          <p:cNvPr id="42" name="Flowchart: Connector 41"/>
+              <a:rPr lang="en-US" sz="900" dirty="0" smtClean="0"/>
+              <a:t>AMQ</a:t>
+            </a:r>
+            <a:endParaRPr lang="en-US" sz="900" dirty="0"/>
+          </a:p>
+        </p:txBody>
+      </p:sp>
+      <p:sp>
+        <p:nvSpPr>
+          <p:cNvPr id="44" name="Flowchart: Connector 43"/>
           <p:cNvSpPr/>
           <p:nvPr/>
         </p:nvSpPr>
         <p:spPr>
           <a:xfrm>
-            <a:off x="5724832" y="3662473"/>
-            <a:ext cx="651385" cy="457200"/>
+            <a:off x="6322816" y="4855796"/>
+            <a:ext cx="1319982" cy="457200"/>
           </a:xfrm>
           <a:prstGeom prst="flowChartConnector">
             <a:avLst/>
@@ -4542,7 +4577,7 @@
             <a:pPr algn="ctr"/>
             <a:r>
               <a:rPr lang="en-US" sz="900" dirty="0" smtClean="0"/>
-              <a:t>AMQ</a:t>
+              <a:t>File://ordersimulator</a:t>
             </a:r>
             <a:endParaRPr lang="en-US" sz="900" dirty="0"/>
           </a:p>
@@ -4550,14 +4585,14 @@
       </p:sp>
       <p:sp>
         <p:nvSpPr>
-          <p:cNvPr id="44" name="Flowchart: Connector 43"/>
+          <p:cNvPr id="45" name="Flowchart: Connector 44"/>
           <p:cNvSpPr/>
           <p:nvPr/>
         </p:nvSpPr>
         <p:spPr>
           <a:xfrm>
-            <a:off x="6904702" y="4954229"/>
-            <a:ext cx="1319982" cy="457200"/>
+            <a:off x="6253995" y="5410587"/>
+            <a:ext cx="1527684" cy="457200"/>
           </a:xfrm>
           <a:prstGeom prst="flowChartConnector">
             <a:avLst/>
@@ -4586,7 +4621,7 @@
             <a:pPr algn="ctr"/>
             <a:r>
               <a:rPr lang="en-US" sz="900" dirty="0" smtClean="0"/>
-              <a:t>File://ordersimulator</a:t>
+              <a:t>File://orderproces</a:t>
             </a:r>
             <a:endParaRPr lang="en-US" sz="900" dirty="0"/>
           </a:p>
@@ -4594,16 +4629,880 @@
       </p:sp>
       <p:sp>
         <p:nvSpPr>
-          <p:cNvPr id="45" name="Flowchart: Connector 44"/>
+          <p:cNvPr id="34" name="Flowchart: Magnetic Disk 33"/>
           <p:cNvSpPr/>
           <p:nvPr/>
         </p:nvSpPr>
         <p:spPr>
           <a:xfrm>
-            <a:off x="6835881" y="5509020"/>
-            <a:ext cx="1527684" cy="457200"/>
-          </a:xfrm>
-          <a:prstGeom prst="flowChartConnector">
+            <a:off x="10572078" y="990879"/>
+            <a:ext cx="914400" cy="552347"/>
+          </a:xfrm>
+          <a:prstGeom prst="flowChartMagneticDisk">
+            <a:avLst/>
+          </a:prstGeom>
+        </p:spPr>
+        <p:style>
+          <a:lnRef idx="1">
+            <a:schemeClr val="accent3"/>
+          </a:lnRef>
+          <a:fillRef idx="2">
+            <a:schemeClr val="accent3"/>
+          </a:fillRef>
+          <a:effectRef idx="1">
+            <a:schemeClr val="accent3"/>
+          </a:effectRef>
+          <a:fontRef idx="minor">
+            <a:schemeClr val="dk1"/>
+          </a:fontRef>
+        </p:style>
+        <p:txBody>
+          <a:bodyPr rtlCol="0" anchor="ctr"/>
+          <a:lstStyle/>
+          <a:p>
+            <a:pPr algn="ctr"/>
+            <a:r>
+              <a:rPr lang="en-US" dirty="0" smtClean="0"/>
+              <a:t>ELK</a:t>
+            </a:r>
+            <a:endParaRPr lang="en-US" dirty="0"/>
+          </a:p>
+        </p:txBody>
+      </p:sp>
+      <p:sp>
+        <p:nvSpPr>
+          <p:cNvPr id="41" name="Flowchart: Magnetic Disk 40"/>
+          <p:cNvSpPr/>
+          <p:nvPr/>
+        </p:nvSpPr>
+        <p:spPr>
+          <a:xfrm>
+            <a:off x="6650293" y="6307479"/>
+            <a:ext cx="914400" cy="573611"/>
+          </a:xfrm>
+          <a:prstGeom prst="flowChartMagneticDisk">
+            <a:avLst/>
+          </a:prstGeom>
+        </p:spPr>
+        <p:style>
+          <a:lnRef idx="1">
+            <a:schemeClr val="accent3"/>
+          </a:lnRef>
+          <a:fillRef idx="2">
+            <a:schemeClr val="accent3"/>
+          </a:fillRef>
+          <a:effectRef idx="1">
+            <a:schemeClr val="accent3"/>
+          </a:effectRef>
+          <a:fontRef idx="minor">
+            <a:schemeClr val="dk1"/>
+          </a:fontRef>
+        </p:style>
+        <p:txBody>
+          <a:bodyPr rtlCol="0" anchor="ctr"/>
+          <a:lstStyle/>
+          <a:p>
+            <a:pPr algn="ctr"/>
+            <a:r>
+              <a:rPr lang="en-US" dirty="0"/>
+              <a:t>File</a:t>
+            </a:r>
+            <a:r>
+              <a:rPr lang="en-US" dirty="0" smtClean="0"/>
+              <a:t> </a:t>
+            </a:r>
+            <a:r>
+              <a:rPr lang="en-US" dirty="0"/>
+              <a:t>Storage</a:t>
+            </a:r>
+            <a:endParaRPr lang="en-US" dirty="0"/>
+          </a:p>
+        </p:txBody>
+      </p:sp>
+      <p:cxnSp>
+        <p:nvCxnSpPr>
+          <p:cNvPr id="19" name="Straight Arrow Connector 18"/>
+          <p:cNvCxnSpPr>
+            <a:stCxn id="17" idx="7"/>
+          </p:cNvCxnSpPr>
+          <p:nvPr/>
+        </p:nvCxnSpPr>
+        <p:spPr>
+          <a:xfrm flipV="1">
+            <a:off x="2994603" y="1364614"/>
+            <a:ext cx="318636" cy="851868"/>
+          </a:xfrm>
+          <a:prstGeom prst="straightConnector1">
+            <a:avLst/>
+          </a:prstGeom>
+          <a:ln>
+            <a:tailEnd type="triangle"/>
+          </a:ln>
+        </p:spPr>
+        <p:style>
+          <a:lnRef idx="1">
+            <a:schemeClr val="accent1"/>
+          </a:lnRef>
+          <a:fillRef idx="0">
+            <a:schemeClr val="accent1"/>
+          </a:fillRef>
+          <a:effectRef idx="0">
+            <a:schemeClr val="accent1"/>
+          </a:effectRef>
+          <a:fontRef idx="minor">
+            <a:schemeClr val="tx1"/>
+          </a:fontRef>
+        </p:style>
+      </p:cxnSp>
+      <p:cxnSp>
+        <p:nvCxnSpPr>
+          <p:cNvPr id="43" name="Straight Arrow Connector 42"/>
+          <p:cNvCxnSpPr>
+            <a:stCxn id="32" idx="7"/>
+            <a:endCxn id="39" idx="2"/>
+          </p:cNvCxnSpPr>
+          <p:nvPr/>
+        </p:nvCxnSpPr>
+        <p:spPr>
+          <a:xfrm flipV="1">
+            <a:off x="3047842" y="2622147"/>
+            <a:ext cx="2732297" cy="636167"/>
+          </a:xfrm>
+          <a:prstGeom prst="straightConnector1">
+            <a:avLst/>
+          </a:prstGeom>
+          <a:ln>
+            <a:tailEnd type="triangle"/>
+          </a:ln>
+        </p:spPr>
+        <p:style>
+          <a:lnRef idx="1">
+            <a:schemeClr val="accent1"/>
+          </a:lnRef>
+          <a:fillRef idx="0">
+            <a:schemeClr val="accent1"/>
+          </a:fillRef>
+          <a:effectRef idx="0">
+            <a:schemeClr val="accent1"/>
+          </a:effectRef>
+          <a:fontRef idx="minor">
+            <a:schemeClr val="tx1"/>
+          </a:fontRef>
+        </p:style>
+      </p:cxnSp>
+      <p:cxnSp>
+        <p:nvCxnSpPr>
+          <p:cNvPr id="46" name="Straight Arrow Connector 45"/>
+          <p:cNvCxnSpPr>
+            <a:stCxn id="33" idx="6"/>
+          </p:cNvCxnSpPr>
+          <p:nvPr/>
+        </p:nvCxnSpPr>
+        <p:spPr>
+          <a:xfrm>
+            <a:off x="3130475" y="4610532"/>
+            <a:ext cx="234294" cy="289973"/>
+          </a:xfrm>
+          <a:prstGeom prst="straightConnector1">
+            <a:avLst/>
+          </a:prstGeom>
+          <a:ln>
+            <a:tailEnd type="triangle"/>
+          </a:ln>
+        </p:spPr>
+        <p:style>
+          <a:lnRef idx="1">
+            <a:schemeClr val="accent1"/>
+          </a:lnRef>
+          <a:fillRef idx="0">
+            <a:schemeClr val="accent1"/>
+          </a:fillRef>
+          <a:effectRef idx="0">
+            <a:schemeClr val="accent1"/>
+          </a:effectRef>
+          <a:fontRef idx="minor">
+            <a:schemeClr val="tx1"/>
+          </a:fontRef>
+        </p:style>
+      </p:cxnSp>
+      <p:cxnSp>
+        <p:nvCxnSpPr>
+          <p:cNvPr id="47" name="Straight Arrow Connector 46"/>
+          <p:cNvCxnSpPr>
+            <a:stCxn id="16" idx="6"/>
+            <a:endCxn id="5" idx="1"/>
+          </p:cNvCxnSpPr>
+          <p:nvPr/>
+        </p:nvCxnSpPr>
+        <p:spPr>
+          <a:xfrm flipV="1">
+            <a:off x="710511" y="2997965"/>
+            <a:ext cx="361337" cy="359747"/>
+          </a:xfrm>
+          <a:prstGeom prst="straightConnector1">
+            <a:avLst/>
+          </a:prstGeom>
+          <a:ln>
+            <a:tailEnd type="triangle"/>
+          </a:ln>
+        </p:spPr>
+        <p:style>
+          <a:lnRef idx="1">
+            <a:schemeClr val="accent1"/>
+          </a:lnRef>
+          <a:fillRef idx="0">
+            <a:schemeClr val="accent1"/>
+          </a:fillRef>
+          <a:effectRef idx="0">
+            <a:schemeClr val="accent1"/>
+          </a:effectRef>
+          <a:fontRef idx="minor">
+            <a:schemeClr val="tx1"/>
+          </a:fontRef>
+        </p:style>
+      </p:cxnSp>
+      <p:cxnSp>
+        <p:nvCxnSpPr>
+          <p:cNvPr id="49" name="Straight Arrow Connector 48"/>
+          <p:cNvCxnSpPr>
+            <a:endCxn id="17" idx="3"/>
+          </p:cNvCxnSpPr>
+          <p:nvPr/>
+        </p:nvCxnSpPr>
+        <p:spPr>
+          <a:xfrm flipV="1">
+            <a:off x="2156493" y="2539772"/>
+            <a:ext cx="332321" cy="293756"/>
+          </a:xfrm>
+          <a:prstGeom prst="straightConnector1">
+            <a:avLst/>
+          </a:prstGeom>
+          <a:ln>
+            <a:tailEnd type="triangle"/>
+          </a:ln>
+        </p:spPr>
+        <p:style>
+          <a:lnRef idx="1">
+            <a:schemeClr val="accent1"/>
+          </a:lnRef>
+          <a:fillRef idx="0">
+            <a:schemeClr val="accent1"/>
+          </a:fillRef>
+          <a:effectRef idx="0">
+            <a:schemeClr val="accent1"/>
+          </a:effectRef>
+          <a:fontRef idx="minor">
+            <a:schemeClr val="tx1"/>
+          </a:fontRef>
+        </p:style>
+      </p:cxnSp>
+      <p:cxnSp>
+        <p:nvCxnSpPr>
+          <p:cNvPr id="50" name="Straight Arrow Connector 49"/>
+          <p:cNvCxnSpPr>
+            <a:endCxn id="33" idx="0"/>
+          </p:cNvCxnSpPr>
+          <p:nvPr/>
+        </p:nvCxnSpPr>
+        <p:spPr>
+          <a:xfrm>
+            <a:off x="2148978" y="3258314"/>
+            <a:ext cx="623850" cy="1123618"/>
+          </a:xfrm>
+          <a:prstGeom prst="straightConnector1">
+            <a:avLst/>
+          </a:prstGeom>
+          <a:ln>
+            <a:tailEnd type="triangle"/>
+          </a:ln>
+        </p:spPr>
+        <p:style>
+          <a:lnRef idx="1">
+            <a:schemeClr val="accent1"/>
+          </a:lnRef>
+          <a:fillRef idx="0">
+            <a:schemeClr val="accent1"/>
+          </a:fillRef>
+          <a:effectRef idx="0">
+            <a:schemeClr val="accent1"/>
+          </a:effectRef>
+          <a:fontRef idx="minor">
+            <a:schemeClr val="tx1"/>
+          </a:fontRef>
+        </p:style>
+      </p:cxnSp>
+      <p:cxnSp>
+        <p:nvCxnSpPr>
+          <p:cNvPr id="51" name="Straight Arrow Connector 50"/>
+          <p:cNvCxnSpPr>
+            <a:endCxn id="32" idx="1"/>
+          </p:cNvCxnSpPr>
+          <p:nvPr/>
+        </p:nvCxnSpPr>
+        <p:spPr>
+          <a:xfrm>
+            <a:off x="2131795" y="3094676"/>
+            <a:ext cx="410258" cy="163638"/>
+          </a:xfrm>
+          <a:prstGeom prst="straightConnector1">
+            <a:avLst/>
+          </a:prstGeom>
+          <a:ln>
+            <a:tailEnd type="triangle"/>
+          </a:ln>
+        </p:spPr>
+        <p:style>
+          <a:lnRef idx="1">
+            <a:schemeClr val="accent1"/>
+          </a:lnRef>
+          <a:fillRef idx="0">
+            <a:schemeClr val="accent1"/>
+          </a:fillRef>
+          <a:effectRef idx="0">
+            <a:schemeClr val="accent1"/>
+          </a:effectRef>
+          <a:fontRef idx="minor">
+            <a:schemeClr val="tx1"/>
+          </a:fontRef>
+        </p:style>
+      </p:cxnSp>
+      <p:cxnSp>
+        <p:nvCxnSpPr>
+          <p:cNvPr id="58" name="Straight Arrow Connector 57"/>
+          <p:cNvCxnSpPr/>
+          <p:nvPr/>
+        </p:nvCxnSpPr>
+        <p:spPr>
+          <a:xfrm flipH="1">
+            <a:off x="-21651" y="3357712"/>
+            <a:ext cx="228261" cy="0"/>
+          </a:xfrm>
+          <a:prstGeom prst="straightConnector1">
+            <a:avLst/>
+          </a:prstGeom>
+          <a:ln>
+            <a:tailEnd type="triangle"/>
+          </a:ln>
+        </p:spPr>
+        <p:style>
+          <a:lnRef idx="1">
+            <a:schemeClr val="accent1"/>
+          </a:lnRef>
+          <a:fillRef idx="0">
+            <a:schemeClr val="accent1"/>
+          </a:fillRef>
+          <a:effectRef idx="0">
+            <a:schemeClr val="accent1"/>
+          </a:effectRef>
+          <a:fontRef idx="minor">
+            <a:schemeClr val="tx1"/>
+          </a:fontRef>
+        </p:style>
+      </p:cxnSp>
+      <p:cxnSp>
+        <p:nvCxnSpPr>
+          <p:cNvPr id="61" name="Straight Arrow Connector 60"/>
+          <p:cNvCxnSpPr>
+            <a:stCxn id="11" idx="3"/>
+            <a:endCxn id="42" idx="2"/>
+          </p:cNvCxnSpPr>
+          <p:nvPr/>
+        </p:nvCxnSpPr>
+        <p:spPr>
+          <a:xfrm flipV="1">
+            <a:off x="5505445" y="3673890"/>
+            <a:ext cx="219387" cy="142669"/>
+          </a:xfrm>
+          <a:prstGeom prst="straightConnector1">
+            <a:avLst/>
+          </a:prstGeom>
+          <a:ln>
+            <a:tailEnd type="triangle"/>
+          </a:ln>
+        </p:spPr>
+        <p:style>
+          <a:lnRef idx="1">
+            <a:schemeClr val="accent1"/>
+          </a:lnRef>
+          <a:fillRef idx="0">
+            <a:schemeClr val="accent1"/>
+          </a:fillRef>
+          <a:effectRef idx="0">
+            <a:schemeClr val="accent1"/>
+          </a:effectRef>
+          <a:fontRef idx="minor">
+            <a:schemeClr val="tx1"/>
+          </a:fontRef>
+        </p:style>
+      </p:cxnSp>
+      <p:cxnSp>
+        <p:nvCxnSpPr>
+          <p:cNvPr id="63" name="Straight Arrow Connector 62"/>
+          <p:cNvCxnSpPr>
+            <a:stCxn id="23" idx="7"/>
+          </p:cNvCxnSpPr>
+          <p:nvPr/>
+        </p:nvCxnSpPr>
+        <p:spPr>
+          <a:xfrm flipH="1" flipV="1">
+            <a:off x="5490265" y="4050369"/>
+            <a:ext cx="555992" cy="917092"/>
+          </a:xfrm>
+          <a:prstGeom prst="straightConnector1">
+            <a:avLst/>
+          </a:prstGeom>
+          <a:ln>
+            <a:tailEnd type="triangle"/>
+          </a:ln>
+        </p:spPr>
+        <p:style>
+          <a:lnRef idx="1">
+            <a:schemeClr val="accent1"/>
+          </a:lnRef>
+          <a:fillRef idx="0">
+            <a:schemeClr val="accent1"/>
+          </a:fillRef>
+          <a:effectRef idx="0">
+            <a:schemeClr val="accent1"/>
+          </a:effectRef>
+          <a:fontRef idx="minor">
+            <a:schemeClr val="tx1"/>
+          </a:fontRef>
+        </p:style>
+      </p:cxnSp>
+      <p:cxnSp>
+        <p:nvCxnSpPr>
+          <p:cNvPr id="65" name="Straight Arrow Connector 64"/>
+          <p:cNvCxnSpPr>
+            <a:endCxn id="35" idx="2"/>
+          </p:cNvCxnSpPr>
+          <p:nvPr/>
+        </p:nvCxnSpPr>
+        <p:spPr>
+          <a:xfrm>
+            <a:off x="6376217" y="3648559"/>
+            <a:ext cx="1680085" cy="11495"/>
+          </a:xfrm>
+          <a:prstGeom prst="straightConnector1">
+            <a:avLst/>
+          </a:prstGeom>
+          <a:ln>
+            <a:tailEnd type="triangle"/>
+          </a:ln>
+        </p:spPr>
+        <p:style>
+          <a:lnRef idx="1">
+            <a:schemeClr val="accent1"/>
+          </a:lnRef>
+          <a:fillRef idx="0">
+            <a:schemeClr val="accent1"/>
+          </a:fillRef>
+          <a:effectRef idx="0">
+            <a:schemeClr val="accent1"/>
+          </a:effectRef>
+          <a:fontRef idx="minor">
+            <a:schemeClr val="tx1"/>
+          </a:fontRef>
+        </p:style>
+      </p:cxnSp>
+      <p:cxnSp>
+        <p:nvCxnSpPr>
+          <p:cNvPr id="67" name="Straight Arrow Connector 66"/>
+          <p:cNvCxnSpPr/>
+          <p:nvPr/>
+        </p:nvCxnSpPr>
+        <p:spPr>
+          <a:xfrm flipV="1">
+            <a:off x="8538017" y="3243133"/>
+            <a:ext cx="1812834" cy="384617"/>
+          </a:xfrm>
+          <a:prstGeom prst="straightConnector1">
+            <a:avLst/>
+          </a:prstGeom>
+          <a:ln>
+            <a:tailEnd type="triangle"/>
+          </a:ln>
+        </p:spPr>
+        <p:style>
+          <a:lnRef idx="1">
+            <a:schemeClr val="accent1"/>
+          </a:lnRef>
+          <a:fillRef idx="0">
+            <a:schemeClr val="accent1"/>
+          </a:fillRef>
+          <a:effectRef idx="0">
+            <a:schemeClr val="accent1"/>
+          </a:effectRef>
+          <a:fontRef idx="minor">
+            <a:schemeClr val="tx1"/>
+          </a:fontRef>
+        </p:style>
+      </p:cxnSp>
+      <p:cxnSp>
+        <p:nvCxnSpPr>
+          <p:cNvPr id="70" name="Straight Arrow Connector 69"/>
+          <p:cNvCxnSpPr>
+            <a:stCxn id="21" idx="5"/>
+          </p:cNvCxnSpPr>
+          <p:nvPr/>
+        </p:nvCxnSpPr>
+        <p:spPr>
+          <a:xfrm>
+            <a:off x="6191980" y="1267053"/>
+            <a:ext cx="4170771" cy="1662174"/>
+          </a:xfrm>
+          <a:prstGeom prst="straightConnector1">
+            <a:avLst/>
+          </a:prstGeom>
+          <a:ln>
+            <a:headEnd type="stealth"/>
+            <a:tailEnd type="none"/>
+          </a:ln>
+        </p:spPr>
+        <p:style>
+          <a:lnRef idx="1">
+            <a:schemeClr val="accent1"/>
+          </a:lnRef>
+          <a:fillRef idx="0">
+            <a:schemeClr val="accent1"/>
+          </a:fillRef>
+          <a:effectRef idx="0">
+            <a:schemeClr val="accent1"/>
+          </a:effectRef>
+          <a:fontRef idx="minor">
+            <a:schemeClr val="tx1"/>
+          </a:fontRef>
+        </p:style>
+      </p:cxnSp>
+      <p:cxnSp>
+        <p:nvCxnSpPr>
+          <p:cNvPr id="78" name="Straight Arrow Connector 77"/>
+          <p:cNvCxnSpPr>
+            <a:stCxn id="22" idx="5"/>
+            <a:endCxn id="12" idx="2"/>
+          </p:cNvCxnSpPr>
+          <p:nvPr/>
+        </p:nvCxnSpPr>
+        <p:spPr>
+          <a:xfrm>
+            <a:off x="8467944" y="2838265"/>
+            <a:ext cx="1920224" cy="222409"/>
+          </a:xfrm>
+          <a:prstGeom prst="straightConnector1">
+            <a:avLst/>
+          </a:prstGeom>
+          <a:ln>
+            <a:tailEnd type="triangle"/>
+          </a:ln>
+        </p:spPr>
+        <p:style>
+          <a:lnRef idx="1">
+            <a:schemeClr val="accent1"/>
+          </a:lnRef>
+          <a:fillRef idx="0">
+            <a:schemeClr val="accent1"/>
+          </a:fillRef>
+          <a:effectRef idx="0">
+            <a:schemeClr val="accent1"/>
+          </a:effectRef>
+          <a:fontRef idx="minor">
+            <a:schemeClr val="tx1"/>
+          </a:fontRef>
+        </p:style>
+      </p:cxnSp>
+      <p:cxnSp>
+        <p:nvCxnSpPr>
+          <p:cNvPr id="82" name="Straight Arrow Connector 81"/>
+          <p:cNvCxnSpPr/>
+          <p:nvPr/>
+        </p:nvCxnSpPr>
+        <p:spPr>
+          <a:xfrm>
+            <a:off x="6416775" y="2606727"/>
+            <a:ext cx="1613714" cy="0"/>
+          </a:xfrm>
+          <a:prstGeom prst="straightConnector1">
+            <a:avLst/>
+          </a:prstGeom>
+          <a:ln>
+            <a:tailEnd type="triangle"/>
+          </a:ln>
+        </p:spPr>
+        <p:style>
+          <a:lnRef idx="1">
+            <a:schemeClr val="accent1"/>
+          </a:lnRef>
+          <a:fillRef idx="0">
+            <a:schemeClr val="accent1"/>
+          </a:fillRef>
+          <a:effectRef idx="0">
+            <a:schemeClr val="accent1"/>
+          </a:effectRef>
+          <a:fontRef idx="minor">
+            <a:schemeClr val="tx1"/>
+          </a:fontRef>
+        </p:style>
+      </p:cxnSp>
+      <p:cxnSp>
+        <p:nvCxnSpPr>
+          <p:cNvPr id="84" name="Straight Arrow Connector 83"/>
+          <p:cNvCxnSpPr>
+            <a:stCxn id="13" idx="5"/>
+            <a:endCxn id="21" idx="3"/>
+          </p:cNvCxnSpPr>
+          <p:nvPr/>
+        </p:nvCxnSpPr>
+        <p:spPr>
+          <a:xfrm flipV="1">
+            <a:off x="3658378" y="1267053"/>
+            <a:ext cx="2092123" cy="37703"/>
+          </a:xfrm>
+          <a:prstGeom prst="straightConnector1">
+            <a:avLst/>
+          </a:prstGeom>
+          <a:ln>
+            <a:tailEnd type="triangle"/>
+          </a:ln>
+        </p:spPr>
+        <p:style>
+          <a:lnRef idx="1">
+            <a:schemeClr val="accent1"/>
+          </a:lnRef>
+          <a:fillRef idx="0">
+            <a:schemeClr val="accent1"/>
+          </a:fillRef>
+          <a:effectRef idx="0">
+            <a:schemeClr val="accent1"/>
+          </a:effectRef>
+          <a:fontRef idx="minor">
+            <a:schemeClr val="tx1"/>
+          </a:fontRef>
+        </p:style>
+      </p:cxnSp>
+      <p:cxnSp>
+        <p:nvCxnSpPr>
+          <p:cNvPr id="87" name="Straight Arrow Connector 86"/>
+          <p:cNvCxnSpPr>
+            <a:stCxn id="44" idx="4"/>
+          </p:cNvCxnSpPr>
+          <p:nvPr/>
+        </p:nvCxnSpPr>
+        <p:spPr>
+          <a:xfrm>
+            <a:off x="6982807" y="5312996"/>
+            <a:ext cx="35030" cy="994483"/>
+          </a:xfrm>
+          <a:prstGeom prst="straightConnector1">
+            <a:avLst/>
+          </a:prstGeom>
+          <a:ln>
+            <a:tailEnd type="triangle"/>
+          </a:ln>
+        </p:spPr>
+        <p:style>
+          <a:lnRef idx="1">
+            <a:schemeClr val="accent1"/>
+          </a:lnRef>
+          <a:fillRef idx="0">
+            <a:schemeClr val="accent1"/>
+          </a:fillRef>
+          <a:effectRef idx="0">
+            <a:schemeClr val="accent1"/>
+          </a:effectRef>
+          <a:fontRef idx="minor">
+            <a:schemeClr val="tx1"/>
+          </a:fontRef>
+        </p:style>
+      </p:cxnSp>
+      <p:cxnSp>
+        <p:nvCxnSpPr>
+          <p:cNvPr id="96" name="Elbow Connector 95"/>
+          <p:cNvCxnSpPr>
+            <a:stCxn id="38" idx="0"/>
+          </p:cNvCxnSpPr>
+          <p:nvPr/>
+        </p:nvCxnSpPr>
+        <p:spPr>
+          <a:xfrm rot="16200000" flipV="1">
+            <a:off x="7247509" y="2271601"/>
+            <a:ext cx="369753" cy="3884238"/>
+          </a:xfrm>
+          <a:prstGeom prst="bentConnector2">
+            <a:avLst/>
+          </a:prstGeom>
+          <a:ln>
+            <a:tailEnd type="triangle"/>
+          </a:ln>
+        </p:spPr>
+        <p:style>
+          <a:lnRef idx="1">
+            <a:schemeClr val="accent1"/>
+          </a:lnRef>
+          <a:fillRef idx="0">
+            <a:schemeClr val="accent1"/>
+          </a:fillRef>
+          <a:effectRef idx="0">
+            <a:schemeClr val="accent1"/>
+          </a:effectRef>
+          <a:fontRef idx="minor">
+            <a:schemeClr val="tx1"/>
+          </a:fontRef>
+        </p:style>
+      </p:cxnSp>
+      <p:cxnSp>
+        <p:nvCxnSpPr>
+          <p:cNvPr id="103" name="Straight Arrow Connector 102"/>
+          <p:cNvCxnSpPr>
+            <a:stCxn id="40" idx="6"/>
+          </p:cNvCxnSpPr>
+          <p:nvPr/>
+        </p:nvCxnSpPr>
+        <p:spPr>
+          <a:xfrm flipV="1">
+            <a:off x="3799114" y="5129106"/>
+            <a:ext cx="1691151" cy="22085"/>
+          </a:xfrm>
+          <a:prstGeom prst="straightConnector1">
+            <a:avLst/>
+          </a:prstGeom>
+          <a:ln>
+            <a:tailEnd type="triangle"/>
+          </a:ln>
+        </p:spPr>
+        <p:style>
+          <a:lnRef idx="1">
+            <a:schemeClr val="accent1"/>
+          </a:lnRef>
+          <a:fillRef idx="0">
+            <a:schemeClr val="accent1"/>
+          </a:fillRef>
+          <a:effectRef idx="0">
+            <a:schemeClr val="accent1"/>
+          </a:effectRef>
+          <a:fontRef idx="minor">
+            <a:schemeClr val="tx1"/>
+          </a:fontRef>
+        </p:style>
+      </p:cxnSp>
+      <p:cxnSp>
+        <p:nvCxnSpPr>
+          <p:cNvPr id="105" name="Straight Arrow Connector 104"/>
+          <p:cNvCxnSpPr>
+            <a:endCxn id="38" idx="1"/>
+          </p:cNvCxnSpPr>
+          <p:nvPr/>
+        </p:nvCxnSpPr>
+        <p:spPr>
+          <a:xfrm flipV="1">
+            <a:off x="7440005" y="4465551"/>
+            <a:ext cx="1704199" cy="22762"/>
+          </a:xfrm>
+          <a:prstGeom prst="straightConnector1">
+            <a:avLst/>
+          </a:prstGeom>
+          <a:ln>
+            <a:tailEnd type="triangle"/>
+          </a:ln>
+        </p:spPr>
+        <p:style>
+          <a:lnRef idx="1">
+            <a:schemeClr val="accent1"/>
+          </a:lnRef>
+          <a:fillRef idx="0">
+            <a:schemeClr val="accent1"/>
+          </a:fillRef>
+          <a:effectRef idx="0">
+            <a:schemeClr val="accent1"/>
+          </a:effectRef>
+          <a:fontRef idx="minor">
+            <a:schemeClr val="tx1"/>
+          </a:fontRef>
+        </p:style>
+      </p:cxnSp>
+      <p:cxnSp>
+        <p:nvCxnSpPr>
+          <p:cNvPr id="107" name="Elbow Connector 106"/>
+          <p:cNvCxnSpPr>
+            <a:stCxn id="37" idx="5"/>
+          </p:cNvCxnSpPr>
+          <p:nvPr/>
+        </p:nvCxnSpPr>
+        <p:spPr>
+          <a:xfrm rot="5400000" flipH="1" flipV="1">
+            <a:off x="8983461" y="4164380"/>
+            <a:ext cx="2062036" cy="865510"/>
+          </a:xfrm>
+          <a:prstGeom prst="bentConnector3">
+            <a:avLst>
+              <a:gd name="adj1" fmla="val -14333"/>
+            </a:avLst>
+          </a:prstGeom>
+          <a:ln>
+            <a:tailEnd type="triangle"/>
+          </a:ln>
+        </p:spPr>
+        <p:style>
+          <a:lnRef idx="1">
+            <a:schemeClr val="accent1"/>
+          </a:lnRef>
+          <a:fillRef idx="0">
+            <a:schemeClr val="accent1"/>
+          </a:fillRef>
+          <a:effectRef idx="0">
+            <a:schemeClr val="accent1"/>
+          </a:effectRef>
+          <a:fontRef idx="minor">
+            <a:schemeClr val="tx1"/>
+          </a:fontRef>
+        </p:style>
+      </p:cxnSp>
+      <p:cxnSp>
+        <p:nvCxnSpPr>
+          <p:cNvPr id="116" name="Elbow Connector 115"/>
+          <p:cNvCxnSpPr>
+            <a:endCxn id="36" idx="0"/>
+          </p:cNvCxnSpPr>
+          <p:nvPr/>
+        </p:nvCxnSpPr>
+        <p:spPr>
+          <a:xfrm rot="10800000" flipV="1">
+            <a:off x="7127832" y="3487355"/>
+            <a:ext cx="3301922" cy="772357"/>
+          </a:xfrm>
+          <a:prstGeom prst="bentConnector2">
+            <a:avLst/>
+          </a:prstGeom>
+          <a:ln>
+            <a:tailEnd type="triangle"/>
+          </a:ln>
+        </p:spPr>
+        <p:style>
+          <a:lnRef idx="1">
+            <a:schemeClr val="accent1"/>
+          </a:lnRef>
+          <a:fillRef idx="0">
+            <a:schemeClr val="accent1"/>
+          </a:fillRef>
+          <a:effectRef idx="0">
+            <a:schemeClr val="accent1"/>
+          </a:effectRef>
+          <a:fontRef idx="minor">
+            <a:schemeClr val="tx1"/>
+          </a:fontRef>
+        </p:style>
+      </p:cxnSp>
+      <p:sp>
+        <p:nvSpPr>
+          <p:cNvPr id="140" name="Left-Right Arrow 139"/>
+          <p:cNvSpPr/>
+          <p:nvPr/>
+        </p:nvSpPr>
+        <p:spPr>
+          <a:xfrm>
+            <a:off x="10084290" y="1170609"/>
+            <a:ext cx="560851" cy="205410"/>
+          </a:xfrm>
+          <a:prstGeom prst="leftRightArrow">
             <a:avLst/>
           </a:prstGeom>
         </p:spPr>
@@ -4628,11 +5527,51 @@
           <a:lstStyle/>
           <a:p>
             <a:pPr algn="ctr"/>
-            <a:r>
-              <a:rPr lang="en-US" sz="900" dirty="0" smtClean="0"/>
-              <a:t>File://orderproces</a:t>
-            </a:r>
-            <a:endParaRPr lang="en-US" sz="900" dirty="0"/>
+            <a:endParaRPr lang="en-US"/>
+          </a:p>
+        </p:txBody>
+      </p:sp>
+      <p:sp>
+        <p:nvSpPr>
+          <p:cNvPr id="2" name="Title 1"/>
+          <p:cNvSpPr>
+            <a:spLocks noGrp="1"/>
+          </p:cNvSpPr>
+          <p:nvPr>
+            <p:ph type="title"/>
+          </p:nvPr>
+        </p:nvSpPr>
+        <p:spPr>
+          <a:xfrm>
+            <a:off x="206946" y="22861"/>
+            <a:ext cx="9877343" cy="287007"/>
+          </a:xfrm>
+        </p:spPr>
+        <p:style>
+          <a:lnRef idx="1">
+            <a:schemeClr val="accent6"/>
+          </a:lnRef>
+          <a:fillRef idx="2">
+            <a:schemeClr val="accent6"/>
+          </a:fillRef>
+          <a:effectRef idx="1">
+            <a:schemeClr val="accent6"/>
+          </a:effectRef>
+          <a:fontRef idx="minor">
+            <a:schemeClr val="dk1"/>
+          </a:fontRef>
+        </p:style>
+        <p:txBody>
+          <a:bodyPr>
+            <a:normAutofit fontScale="90000"/>
+          </a:bodyPr>
+          <a:lstStyle/>
+          <a:p>
+            <a:r>
+              <a:rPr lang="en-US" dirty="0" smtClean="0"/>
+              <a:t>Application Architecture</a:t>
+            </a:r>
+            <a:endParaRPr lang="en-US" dirty="0"/>
           </a:p>
         </p:txBody>
       </p:sp>
@@ -4646,6 +5585,13 @@
   <p:clrMapOvr>
     <a:masterClrMapping/>
   </p:clrMapOvr>
+  <p:timing>
+    <p:tnLst>
+      <p:par>
+        <p:cTn id="1" dur="indefinite" restart="never" nodeType="tmRoot"/>
+      </p:par>
+    </p:tnLst>
+  </p:timing>
 </p:sld>
 </file>
 

</xml_diff>